<commit_message>
modify slide for presentaion
</commit_message>
<xml_diff>
--- a/documents/House_prediction_choi.pptx
+++ b/documents/House_prediction_choi.pptx
@@ -6,19 +6,16 @@
   </p:sldMasterIdLst>
   <p:sldIdLst>
     <p:sldId id="256" r:id="rId2"/>
-    <p:sldId id="263" r:id="rId3"/>
-    <p:sldId id="257" r:id="rId4"/>
-    <p:sldId id="264" r:id="rId5"/>
-    <p:sldId id="265" r:id="rId6"/>
-    <p:sldId id="267" r:id="rId7"/>
-    <p:sldId id="272" r:id="rId8"/>
-    <p:sldId id="273" r:id="rId9"/>
-    <p:sldId id="275" r:id="rId10"/>
-    <p:sldId id="274" r:id="rId11"/>
-    <p:sldId id="277" r:id="rId12"/>
-    <p:sldId id="278" r:id="rId13"/>
-    <p:sldId id="279" r:id="rId14"/>
-    <p:sldId id="262" r:id="rId15"/>
+    <p:sldId id="267" r:id="rId3"/>
+    <p:sldId id="272" r:id="rId4"/>
+    <p:sldId id="273" r:id="rId5"/>
+    <p:sldId id="275" r:id="rId6"/>
+    <p:sldId id="274" r:id="rId7"/>
+    <p:sldId id="280" r:id="rId8"/>
+    <p:sldId id="281" r:id="rId9"/>
+    <p:sldId id="278" r:id="rId10"/>
+    <p:sldId id="282" r:id="rId11"/>
+    <p:sldId id="283" r:id="rId12"/>
   </p:sldIdLst>
   <p:sldSz cx="12192000" cy="6858000"/>
   <p:notesSz cx="6858000" cy="9144000"/>
@@ -272,7 +269,7 @@
           <a:p>
             <a:fld id="{6DABAC08-48C8-004D-B2F3-31BF60B6A58F}" type="datetimeFigureOut">
               <a:rPr lang="en-US" smtClean="0"/>
-              <a:t>11/16/18</a:t>
+              <a:t>11/17/18</a:t>
             </a:fld>
             <a:endParaRPr lang="en-US"/>
           </a:p>
@@ -470,7 +467,7 @@
           <a:p>
             <a:fld id="{6DABAC08-48C8-004D-B2F3-31BF60B6A58F}" type="datetimeFigureOut">
               <a:rPr lang="en-US" smtClean="0"/>
-              <a:t>11/16/18</a:t>
+              <a:t>11/17/18</a:t>
             </a:fld>
             <a:endParaRPr lang="en-US"/>
           </a:p>
@@ -678,7 +675,7 @@
           <a:p>
             <a:fld id="{6DABAC08-48C8-004D-B2F3-31BF60B6A58F}" type="datetimeFigureOut">
               <a:rPr lang="en-US" smtClean="0"/>
-              <a:t>11/16/18</a:t>
+              <a:t>11/17/18</a:t>
             </a:fld>
             <a:endParaRPr lang="en-US"/>
           </a:p>
@@ -876,7 +873,7 @@
           <a:p>
             <a:fld id="{6DABAC08-48C8-004D-B2F3-31BF60B6A58F}" type="datetimeFigureOut">
               <a:rPr lang="en-US" smtClean="0"/>
-              <a:t>11/16/18</a:t>
+              <a:t>11/17/18</a:t>
             </a:fld>
             <a:endParaRPr lang="en-US"/>
           </a:p>
@@ -1151,7 +1148,7 @@
           <a:p>
             <a:fld id="{6DABAC08-48C8-004D-B2F3-31BF60B6A58F}" type="datetimeFigureOut">
               <a:rPr lang="en-US" smtClean="0"/>
-              <a:t>11/16/18</a:t>
+              <a:t>11/17/18</a:t>
             </a:fld>
             <a:endParaRPr lang="en-US"/>
           </a:p>
@@ -1416,7 +1413,7 @@
           <a:p>
             <a:fld id="{6DABAC08-48C8-004D-B2F3-31BF60B6A58F}" type="datetimeFigureOut">
               <a:rPr lang="en-US" smtClean="0"/>
-              <a:t>11/16/18</a:t>
+              <a:t>11/17/18</a:t>
             </a:fld>
             <a:endParaRPr lang="en-US"/>
           </a:p>
@@ -1828,7 +1825,7 @@
           <a:p>
             <a:fld id="{6DABAC08-48C8-004D-B2F3-31BF60B6A58F}" type="datetimeFigureOut">
               <a:rPr lang="en-US" smtClean="0"/>
-              <a:t>11/16/18</a:t>
+              <a:t>11/17/18</a:t>
             </a:fld>
             <a:endParaRPr lang="en-US"/>
           </a:p>
@@ -1969,7 +1966,7 @@
           <a:p>
             <a:fld id="{6DABAC08-48C8-004D-B2F3-31BF60B6A58F}" type="datetimeFigureOut">
               <a:rPr lang="en-US" smtClean="0"/>
-              <a:t>11/16/18</a:t>
+              <a:t>11/17/18</a:t>
             </a:fld>
             <a:endParaRPr lang="en-US"/>
           </a:p>
@@ -2082,7 +2079,7 @@
           <a:p>
             <a:fld id="{6DABAC08-48C8-004D-B2F3-31BF60B6A58F}" type="datetimeFigureOut">
               <a:rPr lang="en-US" smtClean="0"/>
-              <a:t>11/16/18</a:t>
+              <a:t>11/17/18</a:t>
             </a:fld>
             <a:endParaRPr lang="en-US"/>
           </a:p>
@@ -2393,7 +2390,7 @@
           <a:p>
             <a:fld id="{6DABAC08-48C8-004D-B2F3-31BF60B6A58F}" type="datetimeFigureOut">
               <a:rPr lang="en-US" smtClean="0"/>
-              <a:t>11/16/18</a:t>
+              <a:t>11/17/18</a:t>
             </a:fld>
             <a:endParaRPr lang="en-US"/>
           </a:p>
@@ -2681,7 +2678,7 @@
           <a:p>
             <a:fld id="{6DABAC08-48C8-004D-B2F3-31BF60B6A58F}" type="datetimeFigureOut">
               <a:rPr lang="en-US" smtClean="0"/>
-              <a:t>11/16/18</a:t>
+              <a:t>11/17/18</a:t>
             </a:fld>
             <a:endParaRPr lang="en-US"/>
           </a:p>
@@ -2922,7 +2919,7 @@
           <a:p>
             <a:fld id="{6DABAC08-48C8-004D-B2F3-31BF60B6A58F}" type="datetimeFigureOut">
               <a:rPr lang="en-US" smtClean="0"/>
-              <a:t>11/16/18</a:t>
+              <a:t>11/17/18</a:t>
             </a:fld>
             <a:endParaRPr lang="en-US"/>
           </a:p>
@@ -3526,7 +3523,7 @@
         <p:spPr>
           <a:xfrm>
             <a:off x="341543" y="203431"/>
-            <a:ext cx="3805914" cy="630942"/>
+            <a:ext cx="2664512" cy="630942"/>
           </a:xfrm>
           <a:prstGeom prst="rect">
             <a:avLst/>
@@ -3540,10 +3537,9 @@
           <a:lstStyle/>
           <a:p>
             <a:r>
-              <a:rPr lang="en-US" altLang="ko-KR" sz="3500" b="1" dirty="0"/>
-              <a:t>6. Hyper Parameter</a:t>
-            </a:r>
-            <a:endParaRPr lang="en-US" sz="3500" b="1" dirty="0"/>
+              <a:rPr lang="en-US" sz="3500" b="1" dirty="0"/>
+              <a:t>7. Conclusion</a:t>
+            </a:r>
           </a:p>
         </p:txBody>
       </p:sp>
@@ -3621,7 +3617,7 @@
           <a:p>
             <a:r>
               <a:rPr lang="en-US" sz="2500" dirty="0"/>
-              <a:t>To  </a:t>
+              <a:t>2) Detailed Score</a:t>
             </a:r>
           </a:p>
           <a:p>
@@ -3633,40 +3629,665 @@
           </a:p>
         </p:txBody>
       </p:sp>
-      <p:pic>
-        <p:nvPicPr>
-          <p:cNvPr id="10" name="그림 9">
-            <a:extLst>
-              <a:ext uri="{FF2B5EF4-FFF2-40B4-BE49-F238E27FC236}">
-                <a16:creationId xmlns:a16="http://schemas.microsoft.com/office/drawing/2014/main" id="{42BA20B9-4878-2142-9DC6-C0B3E5F8CBB7}"/>
-              </a:ext>
-            </a:extLst>
-          </p:cNvPr>
-          <p:cNvPicPr>
-            <a:picLocks noChangeAspect="1"/>
-          </p:cNvPicPr>
+      <p:graphicFrame>
+        <p:nvGraphicFramePr>
+          <p:cNvPr id="9" name="표 8">
+            <a:extLst>
+              <a:ext uri="{FF2B5EF4-FFF2-40B4-BE49-F238E27FC236}">
+                <a16:creationId xmlns:a16="http://schemas.microsoft.com/office/drawing/2014/main" id="{C1300E24-3408-9640-83A7-9AA712A0C6E9}"/>
+              </a:ext>
+            </a:extLst>
+          </p:cNvPr>
+          <p:cNvGraphicFramePr>
+            <a:graphicFrameLocks noGrp="1"/>
+          </p:cNvGraphicFramePr>
+          <p:nvPr>
+            <p:extLst>
+              <p:ext uri="{D42A27DB-BD31-4B8C-83A1-F6EECF244321}">
+                <p14:modId xmlns:p14="http://schemas.microsoft.com/office/powerpoint/2010/main" val="3366742239"/>
+              </p:ext>
+            </p:extLst>
+          </p:nvPr>
+        </p:nvGraphicFramePr>
+        <p:xfrm>
+          <a:off x="736601" y="1804750"/>
+          <a:ext cx="5978589" cy="3708400"/>
+        </p:xfrm>
+        <a:graphic>
+          <a:graphicData uri="http://schemas.openxmlformats.org/drawingml/2006/table">
+            <a:tbl>
+              <a:tblPr firstRow="1" bandRow="1">
+                <a:tableStyleId>{5940675A-B579-460E-94D1-54222C63F5DA}</a:tableStyleId>
+              </a:tblPr>
+              <a:tblGrid>
+                <a:gridCol w="1914589">
+                  <a:extLst>
+                    <a:ext uri="{9D8B030D-6E8A-4147-A177-3AD203B41FA5}">
+                      <a16:colId xmlns:a16="http://schemas.microsoft.com/office/drawing/2014/main" val="1146838510"/>
+                    </a:ext>
+                  </a:extLst>
+                </a:gridCol>
+                <a:gridCol w="2032000">
+                  <a:extLst>
+                    <a:ext uri="{9D8B030D-6E8A-4147-A177-3AD203B41FA5}">
+                      <a16:colId xmlns:a16="http://schemas.microsoft.com/office/drawing/2014/main" val="4102392166"/>
+                    </a:ext>
+                  </a:extLst>
+                </a:gridCol>
+                <a:gridCol w="2032000">
+                  <a:extLst>
+                    <a:ext uri="{9D8B030D-6E8A-4147-A177-3AD203B41FA5}">
+                      <a16:colId xmlns:a16="http://schemas.microsoft.com/office/drawing/2014/main" val="295858441"/>
+                    </a:ext>
+                  </a:extLst>
+                </a:gridCol>
+              </a:tblGrid>
+              <a:tr h="370840">
+                <a:tc>
+                  <a:txBody>
+                    <a:bodyPr/>
+                    <a:lstStyle/>
+                    <a:p>
+                      <a:pPr latinLnBrk="1"/>
+                      <a:r>
+                        <a:rPr lang="en-US" altLang="ko-KR" dirty="0"/>
+                        <a:t>Model</a:t>
+                      </a:r>
+                      <a:endParaRPr lang="ko-KR" altLang="en-US" dirty="0"/>
+                    </a:p>
+                  </a:txBody>
+                  <a:tcPr/>
+                </a:tc>
+                <a:tc>
+                  <a:txBody>
+                    <a:bodyPr/>
+                    <a:lstStyle/>
+                    <a:p>
+                      <a:pPr latinLnBrk="1"/>
+                      <a:r>
+                        <a:rPr lang="en-US" altLang="ko-KR" dirty="0"/>
+                        <a:t>Train RMSE</a:t>
+                      </a:r>
+                      <a:endParaRPr lang="ko-KR" altLang="en-US" dirty="0"/>
+                    </a:p>
+                  </a:txBody>
+                  <a:tcPr/>
+                </a:tc>
+                <a:tc>
+                  <a:txBody>
+                    <a:bodyPr/>
+                    <a:lstStyle/>
+                    <a:p>
+                      <a:pPr latinLnBrk="1"/>
+                      <a:r>
+                        <a:rPr lang="en-US" altLang="ko-KR" dirty="0"/>
+                        <a:t>Kaggle Score </a:t>
+                      </a:r>
+                      <a:endParaRPr lang="ko-KR" altLang="en-US" dirty="0"/>
+                    </a:p>
+                  </a:txBody>
+                  <a:tcPr/>
+                </a:tc>
+                <a:extLst>
+                  <a:ext uri="{0D108BD9-81ED-4DB2-BD59-A6C34878D82A}">
+                    <a16:rowId xmlns:a16="http://schemas.microsoft.com/office/drawing/2014/main" val="4161090007"/>
+                  </a:ext>
+                </a:extLst>
+              </a:tr>
+              <a:tr h="370840">
+                <a:tc>
+                  <a:txBody>
+                    <a:bodyPr/>
+                    <a:lstStyle/>
+                    <a:p>
+                      <a:pPr latinLnBrk="1"/>
+                      <a:r>
+                        <a:rPr lang="en-US" altLang="ko-KR" dirty="0" err="1"/>
+                        <a:t>Randomforest</a:t>
+                      </a:r>
+                      <a:endParaRPr lang="ko-KR" altLang="en-US" dirty="0"/>
+                    </a:p>
+                  </a:txBody>
+                  <a:tcPr/>
+                </a:tc>
+                <a:tc>
+                  <a:txBody>
+                    <a:bodyPr/>
+                    <a:lstStyle/>
+                    <a:p>
+                      <a:pPr latinLnBrk="1"/>
+                      <a:r>
+                        <a:rPr lang="en-US" altLang="ko-KR" dirty="0"/>
+                        <a:t>0.15893652</a:t>
+                      </a:r>
+                      <a:endParaRPr lang="ko-KR" altLang="en-US" dirty="0"/>
+                    </a:p>
+                  </a:txBody>
+                  <a:tcPr/>
+                </a:tc>
+                <a:tc>
+                  <a:txBody>
+                    <a:bodyPr/>
+                    <a:lstStyle/>
+                    <a:p>
+                      <a:pPr latinLnBrk="1"/>
+                      <a:endParaRPr lang="ko-KR" altLang="en-US" dirty="0"/>
+                    </a:p>
+                  </a:txBody>
+                  <a:tcPr/>
+                </a:tc>
+                <a:extLst>
+                  <a:ext uri="{0D108BD9-81ED-4DB2-BD59-A6C34878D82A}">
+                    <a16:rowId xmlns:a16="http://schemas.microsoft.com/office/drawing/2014/main" val="762782168"/>
+                  </a:ext>
+                </a:extLst>
+              </a:tr>
+              <a:tr h="370840">
+                <a:tc>
+                  <a:txBody>
+                    <a:bodyPr/>
+                    <a:lstStyle/>
+                    <a:p>
+                      <a:pPr latinLnBrk="1"/>
+                      <a:r>
+                        <a:rPr lang="en-US" altLang="ko-KR" dirty="0" err="1"/>
+                        <a:t>ElasticNet</a:t>
+                      </a:r>
+                      <a:endParaRPr lang="ko-KR" altLang="en-US" dirty="0"/>
+                    </a:p>
+                  </a:txBody>
+                  <a:tcPr/>
+                </a:tc>
+                <a:tc>
+                  <a:txBody>
+                    <a:bodyPr/>
+                    <a:lstStyle/>
+                    <a:p>
+                      <a:pPr latinLnBrk="1"/>
+                      <a:r>
+                        <a:rPr lang="en-US" altLang="ko-KR" dirty="0"/>
+                        <a:t>0.10879657</a:t>
+                      </a:r>
+                      <a:endParaRPr lang="ko-KR" altLang="en-US" dirty="0"/>
+                    </a:p>
+                  </a:txBody>
+                  <a:tcPr/>
+                </a:tc>
+                <a:tc>
+                  <a:txBody>
+                    <a:bodyPr/>
+                    <a:lstStyle/>
+                    <a:p>
+                      <a:pPr latinLnBrk="1"/>
+                      <a:endParaRPr lang="ko-KR" altLang="en-US" dirty="0"/>
+                    </a:p>
+                  </a:txBody>
+                  <a:tcPr/>
+                </a:tc>
+                <a:extLst>
+                  <a:ext uri="{0D108BD9-81ED-4DB2-BD59-A6C34878D82A}">
+                    <a16:rowId xmlns:a16="http://schemas.microsoft.com/office/drawing/2014/main" val="719767652"/>
+                  </a:ext>
+                </a:extLst>
+              </a:tr>
+              <a:tr h="370840">
+                <a:tc>
+                  <a:txBody>
+                    <a:bodyPr/>
+                    <a:lstStyle/>
+                    <a:p>
+                      <a:pPr latinLnBrk="1"/>
+                      <a:r>
+                        <a:rPr lang="en-US" altLang="ko-KR" dirty="0"/>
+                        <a:t>Lasso</a:t>
+                      </a:r>
+                      <a:endParaRPr lang="ko-KR" altLang="en-US" dirty="0"/>
+                    </a:p>
+                  </a:txBody>
+                  <a:tcPr/>
+                </a:tc>
+                <a:tc>
+                  <a:txBody>
+                    <a:bodyPr/>
+                    <a:lstStyle/>
+                    <a:p>
+                      <a:pPr latinLnBrk="1"/>
+                      <a:r>
+                        <a:rPr lang="en-US" altLang="ko-KR" dirty="0"/>
+                        <a:t>0.10869445</a:t>
+                      </a:r>
+                      <a:endParaRPr lang="ko-KR" altLang="en-US" dirty="0"/>
+                    </a:p>
+                  </a:txBody>
+                  <a:tcPr/>
+                </a:tc>
+                <a:tc>
+                  <a:txBody>
+                    <a:bodyPr/>
+                    <a:lstStyle/>
+                    <a:p>
+                      <a:pPr latinLnBrk="1"/>
+                      <a:endParaRPr lang="ko-KR" altLang="en-US" dirty="0"/>
+                    </a:p>
+                  </a:txBody>
+                  <a:tcPr/>
+                </a:tc>
+                <a:extLst>
+                  <a:ext uri="{0D108BD9-81ED-4DB2-BD59-A6C34878D82A}">
+                    <a16:rowId xmlns:a16="http://schemas.microsoft.com/office/drawing/2014/main" val="4148613105"/>
+                  </a:ext>
+                </a:extLst>
+              </a:tr>
+              <a:tr h="370840">
+                <a:tc>
+                  <a:txBody>
+                    <a:bodyPr/>
+                    <a:lstStyle/>
+                    <a:p>
+                      <a:pPr latinLnBrk="1"/>
+                      <a:r>
+                        <a:rPr lang="en-US" altLang="ko-KR" dirty="0"/>
+                        <a:t>Ridge</a:t>
+                      </a:r>
+                      <a:endParaRPr lang="ko-KR" altLang="en-US" dirty="0"/>
+                    </a:p>
+                  </a:txBody>
+                  <a:tcPr/>
+                </a:tc>
+                <a:tc>
+                  <a:txBody>
+                    <a:bodyPr/>
+                    <a:lstStyle/>
+                    <a:p>
+                      <a:pPr latinLnBrk="1"/>
+                      <a:r>
+                        <a:rPr lang="en-US" altLang="ko-KR" dirty="0"/>
+                        <a:t>0.11043459</a:t>
+                      </a:r>
+                      <a:endParaRPr lang="ko-KR" altLang="en-US" dirty="0"/>
+                    </a:p>
+                  </a:txBody>
+                  <a:tcPr/>
+                </a:tc>
+                <a:tc>
+                  <a:txBody>
+                    <a:bodyPr/>
+                    <a:lstStyle/>
+                    <a:p>
+                      <a:pPr latinLnBrk="1"/>
+                      <a:endParaRPr lang="ko-KR" altLang="en-US" dirty="0"/>
+                    </a:p>
+                  </a:txBody>
+                  <a:tcPr/>
+                </a:tc>
+                <a:extLst>
+                  <a:ext uri="{0D108BD9-81ED-4DB2-BD59-A6C34878D82A}">
+                    <a16:rowId xmlns:a16="http://schemas.microsoft.com/office/drawing/2014/main" val="2936261071"/>
+                  </a:ext>
+                </a:extLst>
+              </a:tr>
+              <a:tr h="370840">
+                <a:tc>
+                  <a:txBody>
+                    <a:bodyPr/>
+                    <a:lstStyle/>
+                    <a:p>
+                      <a:pPr latinLnBrk="1"/>
+                      <a:r>
+                        <a:rPr lang="en-US" altLang="ko-KR" dirty="0"/>
+                        <a:t>SVR</a:t>
+                      </a:r>
+                      <a:endParaRPr lang="ko-KR" altLang="en-US" dirty="0"/>
+                    </a:p>
+                  </a:txBody>
+                  <a:tcPr/>
+                </a:tc>
+                <a:tc>
+                  <a:txBody>
+                    <a:bodyPr/>
+                    <a:lstStyle/>
+                    <a:p>
+                      <a:pPr latinLnBrk="1"/>
+                      <a:r>
+                        <a:rPr lang="en-US" altLang="ko-KR" dirty="0"/>
+                        <a:t>0.11368618</a:t>
+                      </a:r>
+                      <a:endParaRPr lang="ko-KR" altLang="en-US" dirty="0"/>
+                    </a:p>
+                  </a:txBody>
+                  <a:tcPr/>
+                </a:tc>
+                <a:tc>
+                  <a:txBody>
+                    <a:bodyPr/>
+                    <a:lstStyle/>
+                    <a:p>
+                      <a:pPr latinLnBrk="1"/>
+                      <a:endParaRPr lang="ko-KR" altLang="en-US"/>
+                    </a:p>
+                  </a:txBody>
+                  <a:tcPr/>
+                </a:tc>
+                <a:extLst>
+                  <a:ext uri="{0D108BD9-81ED-4DB2-BD59-A6C34878D82A}">
+                    <a16:rowId xmlns:a16="http://schemas.microsoft.com/office/drawing/2014/main" val="3882724528"/>
+                  </a:ext>
+                </a:extLst>
+              </a:tr>
+              <a:tr h="370840">
+                <a:tc>
+                  <a:txBody>
+                    <a:bodyPr/>
+                    <a:lstStyle/>
+                    <a:p>
+                      <a:pPr latinLnBrk="1"/>
+                      <a:r>
+                        <a:rPr lang="en-US" altLang="ko-KR" dirty="0" err="1"/>
+                        <a:t>XGboost</a:t>
+                      </a:r>
+                      <a:endParaRPr lang="ko-KR" altLang="en-US" dirty="0"/>
+                    </a:p>
+                  </a:txBody>
+                  <a:tcPr/>
+                </a:tc>
+                <a:tc>
+                  <a:txBody>
+                    <a:bodyPr/>
+                    <a:lstStyle/>
+                    <a:p>
+                      <a:pPr latinLnBrk="1"/>
+                      <a:r>
+                        <a:rPr lang="en-US" altLang="ko-KR" dirty="0"/>
+                        <a:t>0.12115257</a:t>
+                      </a:r>
+                      <a:endParaRPr lang="ko-KR" altLang="en-US" dirty="0"/>
+                    </a:p>
+                  </a:txBody>
+                  <a:tcPr/>
+                </a:tc>
+                <a:tc>
+                  <a:txBody>
+                    <a:bodyPr/>
+                    <a:lstStyle/>
+                    <a:p>
+                      <a:pPr latinLnBrk="1"/>
+                      <a:r>
+                        <a:rPr lang="en-US" altLang="ko-KR" sz="1800" b="0" i="0" kern="1200" dirty="0">
+                          <a:solidFill>
+                            <a:schemeClr val="tx1"/>
+                          </a:solidFill>
+                          <a:effectLst/>
+                          <a:latin typeface="+mn-lt"/>
+                          <a:ea typeface="+mn-ea"/>
+                          <a:cs typeface="+mn-cs"/>
+                        </a:rPr>
+                        <a:t>0.12965</a:t>
+                      </a:r>
+                      <a:endParaRPr lang="ko-KR" altLang="en-US" dirty="0"/>
+                    </a:p>
+                  </a:txBody>
+                  <a:tcPr/>
+                </a:tc>
+                <a:extLst>
+                  <a:ext uri="{0D108BD9-81ED-4DB2-BD59-A6C34878D82A}">
+                    <a16:rowId xmlns:a16="http://schemas.microsoft.com/office/drawing/2014/main" val="4042199815"/>
+                  </a:ext>
+                </a:extLst>
+              </a:tr>
+              <a:tr h="370840">
+                <a:tc>
+                  <a:txBody>
+                    <a:bodyPr/>
+                    <a:lstStyle/>
+                    <a:p>
+                      <a:pPr latinLnBrk="1"/>
+                      <a:r>
+                        <a:rPr lang="en-US" altLang="ko-KR" dirty="0" err="1"/>
+                        <a:t>lightGBM</a:t>
+                      </a:r>
+                      <a:endParaRPr lang="ko-KR" altLang="en-US" dirty="0"/>
+                    </a:p>
+                  </a:txBody>
+                  <a:tcPr/>
+                </a:tc>
+                <a:tc>
+                  <a:txBody>
+                    <a:bodyPr/>
+                    <a:lstStyle/>
+                    <a:p>
+                      <a:pPr latinLnBrk="1"/>
+                      <a:r>
+                        <a:rPr lang="en-US" altLang="ko-KR" dirty="0"/>
+                        <a:t>0.13731836</a:t>
+                      </a:r>
+                      <a:endParaRPr lang="ko-KR" altLang="en-US" dirty="0"/>
+                    </a:p>
+                  </a:txBody>
+                  <a:tcPr/>
+                </a:tc>
+                <a:tc>
+                  <a:txBody>
+                    <a:bodyPr/>
+                    <a:lstStyle/>
+                    <a:p>
+                      <a:pPr latinLnBrk="1"/>
+                      <a:r>
+                        <a:rPr lang="en-US" altLang="ko-KR" sz="1800" b="0" i="0" kern="1200" dirty="0">
+                          <a:solidFill>
+                            <a:schemeClr val="tx1"/>
+                          </a:solidFill>
+                          <a:effectLst/>
+                          <a:latin typeface="+mn-lt"/>
+                          <a:ea typeface="+mn-ea"/>
+                          <a:cs typeface="+mn-cs"/>
+                        </a:rPr>
+                        <a:t>0.14344</a:t>
+                      </a:r>
+                      <a:endParaRPr lang="ko-KR" altLang="en-US" dirty="0"/>
+                    </a:p>
+                  </a:txBody>
+                  <a:tcPr/>
+                </a:tc>
+                <a:extLst>
+                  <a:ext uri="{0D108BD9-81ED-4DB2-BD59-A6C34878D82A}">
+                    <a16:rowId xmlns:a16="http://schemas.microsoft.com/office/drawing/2014/main" val="2606687095"/>
+                  </a:ext>
+                </a:extLst>
+              </a:tr>
+              <a:tr h="370840">
+                <a:tc>
+                  <a:txBody>
+                    <a:bodyPr/>
+                    <a:lstStyle/>
+                    <a:p>
+                      <a:pPr latinLnBrk="1"/>
+                      <a:r>
+                        <a:rPr lang="en-US" altLang="ko-KR" dirty="0" err="1"/>
+                        <a:t>StackingRegressor</a:t>
+                      </a:r>
+                      <a:endParaRPr lang="ko-KR" altLang="en-US" dirty="0"/>
+                    </a:p>
+                  </a:txBody>
+                  <a:tcPr/>
+                </a:tc>
+                <a:tc>
+                  <a:txBody>
+                    <a:bodyPr/>
+                    <a:lstStyle/>
+                    <a:p>
+                      <a:pPr latinLnBrk="1"/>
+                      <a:r>
+                        <a:rPr lang="en-US" altLang="ko-KR" dirty="0"/>
+                        <a:t>0.11069786</a:t>
+                      </a:r>
+                      <a:endParaRPr lang="ko-KR" altLang="en-US" dirty="0"/>
+                    </a:p>
+                  </a:txBody>
+                  <a:tcPr/>
+                </a:tc>
+                <a:tc>
+                  <a:txBody>
+                    <a:bodyPr/>
+                    <a:lstStyle/>
+                    <a:p>
+                      <a:pPr latinLnBrk="1"/>
+                      <a:r>
+                        <a:rPr lang="en-US" altLang="ko-KR" sz="1800" b="1" dirty="0">
+                          <a:solidFill>
+                            <a:srgbClr val="FF0000"/>
+                          </a:solidFill>
+                        </a:rPr>
+                        <a:t>0.11554</a:t>
+                      </a:r>
+                      <a:endParaRPr lang="ko-KR" altLang="en-US" b="1" dirty="0">
+                        <a:solidFill>
+                          <a:srgbClr val="FF0000"/>
+                        </a:solidFill>
+                      </a:endParaRPr>
+                    </a:p>
+                  </a:txBody>
+                  <a:tcPr/>
+                </a:tc>
+                <a:extLst>
+                  <a:ext uri="{0D108BD9-81ED-4DB2-BD59-A6C34878D82A}">
+                    <a16:rowId xmlns:a16="http://schemas.microsoft.com/office/drawing/2014/main" val="2508953198"/>
+                  </a:ext>
+                </a:extLst>
+              </a:tr>
+              <a:tr h="370840">
+                <a:tc>
+                  <a:txBody>
+                    <a:bodyPr/>
+                    <a:lstStyle/>
+                    <a:p>
+                      <a:pPr latinLnBrk="1"/>
+                      <a:r>
+                        <a:rPr lang="en-US" altLang="ko-KR" dirty="0"/>
+                        <a:t>Averaged </a:t>
+                      </a:r>
+                      <a:endParaRPr lang="ko-KR" altLang="en-US" dirty="0"/>
+                    </a:p>
+                  </a:txBody>
+                  <a:tcPr/>
+                </a:tc>
+                <a:tc>
+                  <a:txBody>
+                    <a:bodyPr/>
+                    <a:lstStyle/>
+                    <a:p>
+                      <a:pPr latinLnBrk="1"/>
+                      <a:r>
+                        <a:rPr lang="en-US" altLang="ko-KR" dirty="0"/>
+                        <a:t>NA </a:t>
+                      </a:r>
+                      <a:endParaRPr lang="ko-KR" altLang="en-US" dirty="0"/>
+                    </a:p>
+                  </a:txBody>
+                  <a:tcPr/>
+                </a:tc>
+                <a:tc>
+                  <a:txBody>
+                    <a:bodyPr/>
+                    <a:lstStyle/>
+                    <a:p>
+                      <a:pPr latinLnBrk="1"/>
+                      <a:endParaRPr lang="ko-KR" altLang="en-US" dirty="0"/>
+                    </a:p>
+                  </a:txBody>
+                  <a:tcPr/>
+                </a:tc>
+                <a:extLst>
+                  <a:ext uri="{0D108BD9-81ED-4DB2-BD59-A6C34878D82A}">
+                    <a16:rowId xmlns:a16="http://schemas.microsoft.com/office/drawing/2014/main" val="872721524"/>
+                  </a:ext>
+                </a:extLst>
+              </a:tr>
+            </a:tbl>
+          </a:graphicData>
+        </a:graphic>
+      </p:graphicFrame>
+      <p:sp>
+        <p:nvSpPr>
+          <p:cNvPr id="10" name="TextBox 9">
+            <a:extLst>
+              <a:ext uri="{FF2B5EF4-FFF2-40B4-BE49-F238E27FC236}">
+                <a16:creationId xmlns:a16="http://schemas.microsoft.com/office/drawing/2014/main" id="{4A26F433-77BB-0140-BB84-5CEEC9C8185F}"/>
+              </a:ext>
+            </a:extLst>
+          </p:cNvPr>
+          <p:cNvSpPr txBox="1"/>
           <p:nvPr/>
-        </p:nvPicPr>
-        <p:blipFill>
-          <a:blip r:embed="rId2"/>
-          <a:stretch>
-            <a:fillRect/>
-          </a:stretch>
-        </p:blipFill>
+        </p:nvSpPr>
         <p:spPr>
           <a:xfrm>
-            <a:off x="1025979" y="1804749"/>
-            <a:ext cx="5200650" cy="3416485"/>
+            <a:off x="6901543" y="1804750"/>
+            <a:ext cx="5170714" cy="1938992"/>
           </a:xfrm>
           <a:prstGeom prst="rect">
             <a:avLst/>
           </a:prstGeom>
+          <a:noFill/>
         </p:spPr>
-      </p:pic>
+        <p:txBody>
+          <a:bodyPr wrap="square" rtlCol="0">
+            <a:spAutoFit/>
+          </a:bodyPr>
+          <a:lstStyle/>
+          <a:p>
+            <a:r>
+              <a:rPr lang="en-US" sz="2000" dirty="0"/>
+              <a:t>In our Case</a:t>
+            </a:r>
+          </a:p>
+          <a:p>
+            <a:endParaRPr lang="en-US" sz="2000" dirty="0"/>
+          </a:p>
+          <a:p>
+            <a:pPr marL="457200" indent="-457200">
+              <a:buFont typeface="+mj-lt"/>
+              <a:buAutoNum type="arabicPeriod"/>
+            </a:pPr>
+            <a:r>
+              <a:rPr lang="en-US" sz="2000" dirty="0"/>
+              <a:t>Stacking is Best  </a:t>
+            </a:r>
+          </a:p>
+          <a:p>
+            <a:pPr marL="457200" indent="-457200">
+              <a:buFont typeface="+mj-lt"/>
+              <a:buAutoNum type="arabicPeriod"/>
+            </a:pPr>
+            <a:r>
+              <a:rPr lang="en-US" altLang="ko-KR" sz="2000" dirty="0"/>
+              <a:t>boost algorithm was not a good score.</a:t>
+            </a:r>
+          </a:p>
+          <a:p>
+            <a:pPr marL="914400" lvl="1" indent="-457200">
+              <a:buFont typeface="Arial" panose="020B0604020202020204" pitchFamily="34" charset="0"/>
+              <a:buChar char="•"/>
+            </a:pPr>
+            <a:r>
+              <a:rPr lang="en-US" sz="2000" dirty="0"/>
+              <a:t>Need to Tune the Parameter</a:t>
+            </a:r>
+          </a:p>
+          <a:p>
+            <a:pPr marL="457200" indent="-457200">
+              <a:buFont typeface="+mj-lt"/>
+              <a:buAutoNum type="arabicPeriod"/>
+            </a:pPr>
+            <a:r>
+              <a:rPr lang="en-US" sz="2000" dirty="0"/>
+              <a:t>Better linear than tree 	</a:t>
+            </a:r>
+          </a:p>
+        </p:txBody>
+      </p:sp>
     </p:spTree>
     <p:extLst>
       <p:ext uri="{BB962C8B-B14F-4D97-AF65-F5344CB8AC3E}">
-        <p14:creationId xmlns:p14="http://schemas.microsoft.com/office/powerpoint/2010/main" val="2479846826"/>
+        <p14:creationId xmlns:p14="http://schemas.microsoft.com/office/powerpoint/2010/main" val="4171264163"/>
       </p:ext>
     </p:extLst>
   </p:cSld>
@@ -3708,7 +4329,7 @@
         <p:spPr>
           <a:xfrm>
             <a:off x="341543" y="203431"/>
-            <a:ext cx="3361561" cy="630942"/>
+            <a:ext cx="2664512" cy="630942"/>
           </a:xfrm>
           <a:prstGeom prst="rect">
             <a:avLst/>
@@ -3722,10 +4343,9 @@
           <a:lstStyle/>
           <a:p>
             <a:r>
-              <a:rPr lang="en-US" altLang="ko-KR" sz="3500" b="1" dirty="0"/>
-              <a:t>6. Predict Model </a:t>
-            </a:r>
-            <a:endParaRPr lang="en-US" sz="3500" b="1" dirty="0"/>
+              <a:rPr lang="en-US" sz="3500" b="1" dirty="0"/>
+              <a:t>7. Conclusion</a:t>
+            </a:r>
           </a:p>
         </p:txBody>
       </p:sp>
@@ -3788,7 +4408,7 @@
         <p:spPr>
           <a:xfrm>
             <a:off x="650272" y="942976"/>
-            <a:ext cx="10289871" cy="861774"/>
+            <a:ext cx="10289871" cy="477054"/>
           </a:xfrm>
           <a:prstGeom prst="rect">
             <a:avLst/>
@@ -3803,52 +4423,286 @@
           <a:p>
             <a:r>
               <a:rPr lang="en-US" sz="2500" dirty="0"/>
-              <a:t>1) Basic Concept</a:t>
-            </a:r>
-          </a:p>
-          <a:p>
-            <a:pPr marL="285750" indent="-285750">
-              <a:buFont typeface="Arial" panose="020B0604020202020204" pitchFamily="34" charset="0"/>
-              <a:buChar char="•"/>
-            </a:pPr>
+              <a:t>3) I</a:t>
+            </a:r>
+            <a:r>
+              <a:rPr lang="en-US" altLang="ko-KR" sz="2500" dirty="0"/>
+              <a:t>mpression</a:t>
+            </a:r>
             <a:endParaRPr lang="en-US" sz="2500" dirty="0"/>
           </a:p>
         </p:txBody>
       </p:sp>
-      <p:pic>
-        <p:nvPicPr>
-          <p:cNvPr id="10" name="그림 9">
-            <a:extLst>
-              <a:ext uri="{FF2B5EF4-FFF2-40B4-BE49-F238E27FC236}">
-                <a16:creationId xmlns:a16="http://schemas.microsoft.com/office/drawing/2014/main" id="{42BA20B9-4878-2142-9DC6-C0B3E5F8CBB7}"/>
-              </a:ext>
-            </a:extLst>
-          </p:cNvPr>
-          <p:cNvPicPr>
-            <a:picLocks noChangeAspect="1"/>
-          </p:cNvPicPr>
+      <p:sp>
+        <p:nvSpPr>
+          <p:cNvPr id="7" name="TextBox 6">
+            <a:extLst>
+              <a:ext uri="{FF2B5EF4-FFF2-40B4-BE49-F238E27FC236}">
+                <a16:creationId xmlns:a16="http://schemas.microsoft.com/office/drawing/2014/main" id="{E0AC7F89-8BC2-0A4E-ABBE-094698C8668B}"/>
+              </a:ext>
+            </a:extLst>
+          </p:cNvPr>
+          <p:cNvSpPr txBox="1"/>
           <p:nvPr/>
-        </p:nvPicPr>
-        <p:blipFill>
-          <a:blip r:embed="rId2"/>
-          <a:stretch>
-            <a:fillRect/>
-          </a:stretch>
-        </p:blipFill>
+        </p:nvSpPr>
         <p:spPr>
           <a:xfrm>
-            <a:off x="1025979" y="1804750"/>
-            <a:ext cx="4884964" cy="3209100"/>
+            <a:off x="761998" y="1528633"/>
+            <a:ext cx="10787743" cy="3170099"/>
           </a:xfrm>
           <a:prstGeom prst="rect">
             <a:avLst/>
           </a:prstGeom>
+          <a:noFill/>
         </p:spPr>
-      </p:pic>
+        <p:txBody>
+          <a:bodyPr wrap="square" rtlCol="0">
+            <a:spAutoFit/>
+          </a:bodyPr>
+          <a:lstStyle/>
+          <a:p>
+            <a:pPr marL="342900" indent="-342900" fontAlgn="base">
+              <a:buFont typeface="Arial" panose="020B0604020202020204" pitchFamily="34" charset="0"/>
+              <a:buChar char="•"/>
+            </a:pPr>
+            <a:r>
+              <a:rPr lang="en-US" altLang="ko-KR" sz="2000" dirty="0"/>
+              <a:t>All of Parameter is Importance </a:t>
+            </a:r>
+          </a:p>
+          <a:p>
+            <a:pPr marL="914400" lvl="1" indent="-457200" fontAlgn="base">
+              <a:buFont typeface="+mj-lt"/>
+              <a:buAutoNum type="alphaLcPeriod"/>
+            </a:pPr>
+            <a:r>
+              <a:rPr lang="en-US" altLang="ko-KR" sz="2000" dirty="0"/>
+              <a:t>Skew , </a:t>
+            </a:r>
+            <a:r>
+              <a:rPr lang="en-US" altLang="ko-KR" sz="2000" dirty="0" err="1"/>
+              <a:t>Zscore</a:t>
+            </a:r>
+            <a:r>
+              <a:rPr lang="en-US" altLang="ko-KR" sz="2000" dirty="0"/>
+              <a:t> and so many variable to select  </a:t>
+            </a:r>
+          </a:p>
+          <a:p>
+            <a:pPr marL="914400" lvl="1" indent="-457200" fontAlgn="base">
+              <a:buFont typeface="+mj-lt"/>
+              <a:buAutoNum type="alphaLcPeriod"/>
+            </a:pPr>
+            <a:r>
+              <a:rPr lang="en-US" altLang="ko-KR" sz="2000" dirty="0"/>
+              <a:t>Model hyperparameter</a:t>
+            </a:r>
+          </a:p>
+          <a:p>
+            <a:pPr marL="914400" lvl="1" indent="-457200" fontAlgn="base">
+              <a:buFont typeface="+mj-lt"/>
+              <a:buAutoNum type="alphaLcPeriod"/>
+            </a:pPr>
+            <a:endParaRPr lang="en-US" altLang="ko-KR" sz="2000" dirty="0"/>
+          </a:p>
+          <a:p>
+            <a:pPr marL="342900" indent="-342900" fontAlgn="base">
+              <a:buFont typeface="Arial" panose="020B0604020202020204" pitchFamily="34" charset="0"/>
+              <a:buChar char="•"/>
+            </a:pPr>
+            <a:r>
+              <a:rPr lang="en-US" altLang="ko-KR" sz="2000" dirty="0"/>
+              <a:t>Feature engineering is most important to predict price</a:t>
+            </a:r>
+          </a:p>
+          <a:p>
+            <a:pPr marL="914400" lvl="1" indent="-457200" fontAlgn="base">
+              <a:buFont typeface="+mj-lt"/>
+              <a:buAutoNum type="alphaLcPeriod"/>
+            </a:pPr>
+            <a:r>
+              <a:rPr lang="en-US" altLang="ko-KR" sz="2000" dirty="0" err="1"/>
+              <a:t>FillNa</a:t>
+            </a:r>
+            <a:r>
+              <a:rPr lang="en-US" altLang="ko-KR" sz="2000" dirty="0"/>
+              <a:t> ( 0 , Mode</a:t>
+            </a:r>
+            <a:r>
+              <a:rPr lang="ko-KR" altLang="en-US" sz="2000" dirty="0"/>
+              <a:t> </a:t>
+            </a:r>
+            <a:r>
+              <a:rPr lang="en-US" altLang="ko-KR" sz="2000" dirty="0"/>
+              <a:t>,</a:t>
+            </a:r>
+            <a:r>
+              <a:rPr lang="ko-KR" altLang="en-US" sz="2000" dirty="0"/>
+              <a:t> </a:t>
+            </a:r>
+            <a:r>
+              <a:rPr lang="en-US" altLang="ko-KR" sz="2000" dirty="0"/>
+              <a:t>median ) </a:t>
+            </a:r>
+          </a:p>
+          <a:p>
+            <a:pPr marL="914400" lvl="1" indent="-457200" fontAlgn="base">
+              <a:buFont typeface="+mj-lt"/>
+              <a:buAutoNum type="alphaLcPeriod"/>
+            </a:pPr>
+            <a:r>
+              <a:rPr lang="en-US" altLang="ko-KR" sz="2000" dirty="0"/>
+              <a:t>binning </a:t>
+            </a:r>
+          </a:p>
+          <a:p>
+            <a:pPr marL="914400" lvl="1" indent="-457200" fontAlgn="base">
+              <a:buFont typeface="+mj-lt"/>
+              <a:buAutoNum type="alphaLcPeriod"/>
+            </a:pPr>
+            <a:r>
+              <a:rPr lang="en-US" altLang="ko-KR" sz="2000" dirty="0"/>
+              <a:t>Using Domain Knowledge</a:t>
+            </a:r>
+          </a:p>
+          <a:p>
+            <a:pPr lvl="1" fontAlgn="base"/>
+            <a:endParaRPr lang="en-US" altLang="ko-KR" sz="2000" dirty="0"/>
+          </a:p>
+          <a:p>
+            <a:pPr marL="914400" lvl="1" indent="-457200" fontAlgn="base">
+              <a:buFont typeface="+mj-lt"/>
+              <a:buAutoNum type="alphaLcPeriod"/>
+            </a:pPr>
+            <a:endParaRPr lang="en-US" altLang="ko-KR" sz="2000" dirty="0"/>
+          </a:p>
+        </p:txBody>
+      </p:sp>
+      <p:sp>
+        <p:nvSpPr>
+          <p:cNvPr id="8" name="TextBox 7">
+            <a:extLst>
+              <a:ext uri="{FF2B5EF4-FFF2-40B4-BE49-F238E27FC236}">
+                <a16:creationId xmlns:a16="http://schemas.microsoft.com/office/drawing/2014/main" id="{6A7431CB-F4C0-DE4C-A22F-1B0E6E8D010D}"/>
+              </a:ext>
+            </a:extLst>
+          </p:cNvPr>
+          <p:cNvSpPr txBox="1"/>
+          <p:nvPr/>
+        </p:nvSpPr>
+        <p:spPr>
+          <a:xfrm>
+            <a:off x="761998" y="4299503"/>
+            <a:ext cx="10787743" cy="3170099"/>
+          </a:xfrm>
+          <a:prstGeom prst="rect">
+            <a:avLst/>
+          </a:prstGeom>
+          <a:noFill/>
+        </p:spPr>
+        <p:txBody>
+          <a:bodyPr wrap="square" rtlCol="0">
+            <a:spAutoFit/>
+          </a:bodyPr>
+          <a:lstStyle/>
+          <a:p>
+            <a:pPr marL="342900" indent="-342900" fontAlgn="base">
+              <a:buFont typeface="Arial" panose="020B0604020202020204" pitchFamily="34" charset="0"/>
+              <a:buChar char="•"/>
+            </a:pPr>
+            <a:r>
+              <a:rPr lang="en-US" altLang="ko-KR" sz="2000" dirty="0"/>
+              <a:t>If the data is huge..</a:t>
+            </a:r>
+          </a:p>
+          <a:p>
+            <a:pPr marL="800100" lvl="1" indent="-342900" fontAlgn="base">
+              <a:buFont typeface="Arial" panose="020B0604020202020204" pitchFamily="34" charset="0"/>
+              <a:buChar char="•"/>
+            </a:pPr>
+            <a:r>
+              <a:rPr lang="en-US" altLang="ko-KR" sz="2000" dirty="0"/>
+              <a:t>Use the feature Selection</a:t>
+            </a:r>
+          </a:p>
+          <a:p>
+            <a:pPr marL="1257300" lvl="2" indent="-342900" fontAlgn="base">
+              <a:buFont typeface="Arial" panose="020B0604020202020204" pitchFamily="34" charset="0"/>
+              <a:buChar char="•"/>
+            </a:pPr>
+            <a:r>
+              <a:rPr lang="en-US" altLang="ko-KR" sz="2000" dirty="0"/>
+              <a:t>Feature Importance</a:t>
+            </a:r>
+          </a:p>
+          <a:p>
+            <a:pPr marL="800100" lvl="1" indent="-342900" fontAlgn="base">
+              <a:buFont typeface="Arial" panose="020B0604020202020204" pitchFamily="34" charset="0"/>
+              <a:buChar char="•"/>
+            </a:pPr>
+            <a:r>
+              <a:rPr lang="en-US" altLang="ko-KR" sz="2000" dirty="0"/>
+              <a:t>Use the feature Extraction</a:t>
+            </a:r>
+          </a:p>
+          <a:p>
+            <a:pPr marL="1257300" lvl="2" indent="-342900" fontAlgn="base">
+              <a:buFont typeface="Arial" panose="020B0604020202020204" pitchFamily="34" charset="0"/>
+              <a:buChar char="•"/>
+            </a:pPr>
+            <a:r>
+              <a:rPr lang="en-US" altLang="ko-KR" sz="2000" dirty="0"/>
+              <a:t>PCA ( for reduce )</a:t>
+            </a:r>
+          </a:p>
+          <a:p>
+            <a:pPr marL="800100" lvl="1" indent="-342900" fontAlgn="base">
+              <a:buFont typeface="Arial" panose="020B0604020202020204" pitchFamily="34" charset="0"/>
+              <a:buChar char="•"/>
+            </a:pPr>
+            <a:r>
+              <a:rPr lang="en-US" altLang="ko-KR" sz="2000" dirty="0" err="1"/>
+              <a:t>RandomSearch</a:t>
+            </a:r>
+            <a:r>
+              <a:rPr lang="en-US" altLang="ko-KR" sz="2000" dirty="0"/>
+              <a:t> for finding Parameter</a:t>
+            </a:r>
+          </a:p>
+          <a:p>
+            <a:pPr marL="1257300" lvl="2" indent="-342900" fontAlgn="base">
+              <a:buFont typeface="Arial" panose="020B0604020202020204" pitchFamily="34" charset="0"/>
+              <a:buChar char="•"/>
+            </a:pPr>
+            <a:endParaRPr lang="en-US" altLang="ko-KR" sz="2000" dirty="0"/>
+          </a:p>
+          <a:p>
+            <a:pPr marL="2628900" lvl="5" indent="-342900" fontAlgn="base">
+              <a:buFont typeface="Arial" panose="020B0604020202020204" pitchFamily="34" charset="0"/>
+              <a:buChar char="•"/>
+            </a:pPr>
+            <a:endParaRPr lang="en-US" altLang="ko-KR" sz="2000" dirty="0"/>
+          </a:p>
+          <a:p>
+            <a:pPr marL="1257300" lvl="2" indent="-342900" fontAlgn="base">
+              <a:buFont typeface="Arial" panose="020B0604020202020204" pitchFamily="34" charset="0"/>
+              <a:buChar char="•"/>
+            </a:pPr>
+            <a:endParaRPr lang="en-US" altLang="ko-KR" sz="2000" dirty="0"/>
+          </a:p>
+          <a:p>
+            <a:pPr marL="914400" lvl="1" indent="-457200" fontAlgn="base">
+              <a:buFont typeface="+mj-lt"/>
+              <a:buAutoNum type="alphaLcPeriod"/>
+            </a:pPr>
+            <a:endParaRPr lang="en-US" altLang="ko-KR" sz="2000" dirty="0"/>
+          </a:p>
+        </p:txBody>
+      </p:sp>
     </p:spTree>
     <p:extLst>
       <p:ext uri="{BB962C8B-B14F-4D97-AF65-F5344CB8AC3E}">
-        <p14:creationId xmlns:p14="http://schemas.microsoft.com/office/powerpoint/2010/main" val="731670767"/>
+        <p14:creationId xmlns:p14="http://schemas.microsoft.com/office/powerpoint/2010/main" val="695729114"/>
       </p:ext>
     </p:extLst>
   </p:cSld>
@@ -3858,7 +4712,7 @@
 </p:sld>
 </file>
 
-<file path=ppt/slides/slide12.xml><?xml version="1.0" encoding="utf-8"?>
+<file path=ppt/slides/slide2.xml><?xml version="1.0" encoding="utf-8"?>
 <p:sld xmlns:a="http://schemas.openxmlformats.org/drawingml/2006/main" xmlns:r="http://schemas.openxmlformats.org/officeDocument/2006/relationships" xmlns:p="http://schemas.openxmlformats.org/presentationml/2006/main">
   <p:cSld>
     <p:spTree>
@@ -3890,7 +4744,7 @@
         <p:spPr>
           <a:xfrm>
             <a:off x="341543" y="203431"/>
-            <a:ext cx="2664512" cy="630942"/>
+            <a:ext cx="3361561" cy="630942"/>
           </a:xfrm>
           <a:prstGeom prst="rect">
             <a:avLst/>
@@ -3904,9 +4758,10 @@
           <a:lstStyle/>
           <a:p>
             <a:r>
-              <a:rPr lang="en-US" sz="3500" b="1" dirty="0"/>
-              <a:t>8. Conclusion</a:t>
-            </a:r>
+              <a:rPr lang="en-US" altLang="ko-KR" sz="3500" b="1" dirty="0"/>
+              <a:t>5. Predict Model </a:t>
+            </a:r>
+            <a:endParaRPr lang="en-US" sz="3500" b="1" dirty="0"/>
           </a:p>
         </p:txBody>
       </p:sp>
@@ -3969,7 +4824,7 @@
         <p:spPr>
           <a:xfrm>
             <a:off x="650272" y="942976"/>
-            <a:ext cx="10289871" cy="861774"/>
+            <a:ext cx="10289871" cy="5155257"/>
           </a:xfrm>
           <a:prstGeom prst="rect">
             <a:avLst/>
@@ -3984,124 +4839,134 @@
           <a:p>
             <a:r>
               <a:rPr lang="en-US" sz="2500" dirty="0"/>
-              <a:t>1) Score</a:t>
-            </a:r>
-          </a:p>
-          <a:p>
-            <a:pPr marL="285750" indent="-285750">
+              <a:t>1) Model Selection Concept </a:t>
+            </a:r>
+          </a:p>
+          <a:p>
+            <a:pPr marL="457200" indent="-457200">
+              <a:buAutoNum type="arabicParenR"/>
+            </a:pPr>
+            <a:endParaRPr lang="en-US" sz="2500" dirty="0"/>
+          </a:p>
+          <a:p>
+            <a:pPr marL="971550" lvl="1" indent="-514350">
+              <a:buFont typeface="+mj-lt"/>
+              <a:buAutoNum type="romanUcPeriod"/>
+            </a:pPr>
+            <a:r>
+              <a:rPr lang="en-US" sz="2800" dirty="0"/>
+              <a:t>Start with Lasso ( Test / Feature Selection )</a:t>
+            </a:r>
+          </a:p>
+          <a:p>
+            <a:pPr marL="1371600" lvl="2" indent="-457200">
               <a:buFont typeface="Arial" panose="020B0604020202020204" pitchFamily="34" charset="0"/>
               <a:buChar char="•"/>
             </a:pPr>
-            <a:endParaRPr lang="en-US" sz="2500" dirty="0"/>
-          </a:p>
-        </p:txBody>
-      </p:sp>
-      <p:sp>
-        <p:nvSpPr>
-          <p:cNvPr id="7" name="TextBox 6">
-            <a:extLst>
-              <a:ext uri="{FF2B5EF4-FFF2-40B4-BE49-F238E27FC236}">
-                <a16:creationId xmlns:a16="http://schemas.microsoft.com/office/drawing/2014/main" id="{BEE44A70-4F14-5B43-A934-581E324D7DD2}"/>
-              </a:ext>
-            </a:extLst>
-          </p:cNvPr>
-          <p:cNvSpPr txBox="1"/>
-          <p:nvPr/>
-        </p:nvSpPr>
-        <p:spPr>
-          <a:xfrm>
-            <a:off x="8327571" y="1804750"/>
-            <a:ext cx="3512000" cy="1708160"/>
-          </a:xfrm>
-          <a:prstGeom prst="rect">
-            <a:avLst/>
-          </a:prstGeom>
-          <a:noFill/>
-        </p:spPr>
-        <p:txBody>
-          <a:bodyPr wrap="square" rtlCol="0">
-            <a:spAutoFit/>
-          </a:bodyPr>
-          <a:lstStyle/>
-          <a:p>
-            <a:pPr marL="342900" indent="-342900" fontAlgn="base">
+            <a:r>
+              <a:rPr lang="en-US" sz="2500" dirty="0"/>
+              <a:t>Fast and Good result  </a:t>
+            </a:r>
+          </a:p>
+          <a:p>
+            <a:pPr marL="1371600" lvl="2" indent="-457200">
               <a:buFont typeface="Arial" panose="020B0604020202020204" pitchFamily="34" charset="0"/>
               <a:buChar char="•"/>
             </a:pPr>
             <a:r>
-              <a:rPr lang="en-US" sz="2000" dirty="0"/>
-              <a:t>Final Kaggle Score : </a:t>
-            </a:r>
-            <a:r>
-              <a:rPr lang="en-US" altLang="ko-KR" sz="2000" dirty="0"/>
-              <a:t>0.11554</a:t>
-            </a:r>
-          </a:p>
-          <a:p>
-            <a:pPr fontAlgn="base"/>
-            <a:endParaRPr lang="en-US" altLang="ko-KR" sz="2000" dirty="0"/>
-          </a:p>
-          <a:p>
-            <a:pPr marL="342900" indent="-342900" fontAlgn="base">
+              <a:rPr lang="en-US" sz="2500" dirty="0"/>
+              <a:t>A few Parameter</a:t>
+            </a:r>
+          </a:p>
+          <a:p>
+            <a:pPr lvl="1"/>
+            <a:endParaRPr lang="en-US" sz="2500" dirty="0"/>
+          </a:p>
+          <a:p>
+            <a:pPr marL="971550" lvl="1" indent="-514350">
+              <a:buFont typeface="+mj-lt"/>
+              <a:buAutoNum type="romanUcPeriod" startAt="2"/>
+            </a:pPr>
+            <a:r>
+              <a:rPr lang="en-US" sz="2800" dirty="0"/>
+              <a:t>Add </a:t>
+            </a:r>
+            <a:r>
+              <a:rPr lang="en-US" altLang="ko-KR" sz="2800" dirty="0"/>
+              <a:t>Supervised Learning ML </a:t>
+            </a:r>
+          </a:p>
+          <a:p>
+            <a:pPr marL="1371600" lvl="2" indent="-457200">
               <a:buFont typeface="Arial" panose="020B0604020202020204" pitchFamily="34" charset="0"/>
               <a:buChar char="•"/>
             </a:pPr>
             <a:r>
-              <a:rPr lang="en-US" altLang="ko-KR" sz="2000" b="1" u="sng" dirty="0"/>
-              <a:t>Top 8% </a:t>
-            </a:r>
-            <a:r>
-              <a:rPr lang="en-US" altLang="ko-KR" sz="2000" dirty="0"/>
-              <a:t>( 11/17, 2018 )</a:t>
-            </a:r>
-            <a:br>
-              <a:rPr lang="en-US" altLang="ko-KR" sz="2000" dirty="0"/>
-            </a:br>
-            <a:endParaRPr lang="en-US" sz="2000" dirty="0"/>
-          </a:p>
-          <a:p>
-            <a:pPr marL="285750" indent="-285750">
+              <a:rPr lang="en-US" altLang="ko-KR" sz="2500" dirty="0"/>
+              <a:t>Ridge / </a:t>
+            </a:r>
+            <a:r>
+              <a:rPr lang="en-US" altLang="ko-KR" sz="2500" dirty="0" err="1"/>
+              <a:t>RandomForest</a:t>
+            </a:r>
+            <a:r>
+              <a:rPr lang="en-US" altLang="ko-KR" sz="2500" dirty="0"/>
+              <a:t>  / Boost .. </a:t>
+            </a:r>
+          </a:p>
+          <a:p>
+            <a:pPr marL="1371600" lvl="2" indent="-457200">
               <a:buFont typeface="Arial" panose="020B0604020202020204" pitchFamily="34" charset="0"/>
               <a:buChar char="•"/>
             </a:pPr>
+            <a:r>
+              <a:rPr lang="en-US" altLang="ko-KR" sz="2400" dirty="0"/>
+              <a:t>Comparison of results between various algorithms</a:t>
+            </a:r>
+          </a:p>
+          <a:p>
+            <a:pPr marL="1371600" lvl="2" indent="-457200">
+              <a:buFont typeface="Arial" panose="020B0604020202020204" pitchFamily="34" charset="0"/>
+              <a:buChar char="•"/>
+            </a:pPr>
+            <a:endParaRPr lang="en-US" altLang="ko-KR" sz="2400" dirty="0"/>
+          </a:p>
+          <a:p>
+            <a:pPr marL="971550" lvl="1" indent="-514350">
+              <a:buFont typeface="+mj-lt"/>
+              <a:buAutoNum type="romanUcPeriod" startAt="3"/>
+            </a:pPr>
+            <a:r>
+              <a:rPr lang="en-US" altLang="ko-KR" sz="2800" dirty="0"/>
+              <a:t>Make Stacking / Average Model </a:t>
+            </a:r>
+          </a:p>
+          <a:p>
+            <a:pPr marL="1257300" lvl="2" indent="-342900">
+              <a:buFont typeface="Arial" panose="020B0604020202020204" pitchFamily="34" charset="0"/>
+              <a:buChar char="•"/>
+            </a:pPr>
+            <a:r>
+              <a:rPr lang="ko-KR" altLang="en-US" sz="2500" dirty="0"/>
+              <a:t> </a:t>
+            </a:r>
+            <a:r>
+              <a:rPr lang="en-US" altLang="ko-KR" sz="2500" dirty="0"/>
+              <a:t>To reduce residual, Make a Integrated model</a:t>
+            </a:r>
+          </a:p>
+          <a:p>
+            <a:pPr marL="914400" lvl="1" indent="-457200">
+              <a:buAutoNum type="arabicParenR"/>
+            </a:pPr>
             <a:endParaRPr lang="en-US" sz="2500" dirty="0"/>
           </a:p>
         </p:txBody>
       </p:sp>
-      <p:pic>
-        <p:nvPicPr>
-          <p:cNvPr id="5" name="그림 4">
-            <a:extLst>
-              <a:ext uri="{FF2B5EF4-FFF2-40B4-BE49-F238E27FC236}">
-                <a16:creationId xmlns:a16="http://schemas.microsoft.com/office/drawing/2014/main" id="{2FA5A8A6-45F9-2840-B9E2-BFEAAF15FA68}"/>
-              </a:ext>
-            </a:extLst>
-          </p:cNvPr>
-          <p:cNvPicPr>
-            <a:picLocks noChangeAspect="1"/>
-          </p:cNvPicPr>
-          <p:nvPr/>
-        </p:nvPicPr>
-        <p:blipFill>
-          <a:blip r:embed="rId2"/>
-          <a:stretch>
-            <a:fillRect/>
-          </a:stretch>
-        </p:blipFill>
-        <p:spPr>
-          <a:xfrm>
-            <a:off x="650272" y="1578427"/>
-            <a:ext cx="7677299" cy="4050964"/>
-          </a:xfrm>
-          <a:prstGeom prst="rect">
-            <a:avLst/>
-          </a:prstGeom>
-        </p:spPr>
-      </p:pic>
     </p:spTree>
     <p:extLst>
       <p:ext uri="{BB962C8B-B14F-4D97-AF65-F5344CB8AC3E}">
-        <p14:creationId xmlns:p14="http://schemas.microsoft.com/office/powerpoint/2010/main" val="1981028433"/>
+        <p14:creationId xmlns:p14="http://schemas.microsoft.com/office/powerpoint/2010/main" val="2714429459"/>
       </p:ext>
     </p:extLst>
   </p:cSld>
@@ -4111,7 +4976,7 @@
 </p:sld>
 </file>
 
-<file path=ppt/slides/slide13.xml><?xml version="1.0" encoding="utf-8"?>
+<file path=ppt/slides/slide3.xml><?xml version="1.0" encoding="utf-8"?>
 <p:sld xmlns:a="http://schemas.openxmlformats.org/drawingml/2006/main" xmlns:r="http://schemas.openxmlformats.org/officeDocument/2006/relationships" xmlns:p="http://schemas.openxmlformats.org/presentationml/2006/main">
   <p:cSld>
     <p:spTree>
@@ -4143,7 +5008,7 @@
         <p:spPr>
           <a:xfrm>
             <a:off x="341543" y="203431"/>
-            <a:ext cx="2664512" cy="630942"/>
+            <a:ext cx="3361561" cy="630942"/>
           </a:xfrm>
           <a:prstGeom prst="rect">
             <a:avLst/>
@@ -4157,9 +5022,10 @@
           <a:lstStyle/>
           <a:p>
             <a:r>
-              <a:rPr lang="en-US" sz="3500" b="1" dirty="0"/>
-              <a:t>8. Conclusion</a:t>
-            </a:r>
+              <a:rPr lang="en-US" altLang="ko-KR" sz="3500" b="1" dirty="0"/>
+              <a:t>5. Predict Model </a:t>
+            </a:r>
+            <a:endParaRPr lang="en-US" sz="3500" b="1" dirty="0"/>
           </a:p>
         </p:txBody>
       </p:sp>
@@ -4237,21 +5103,8 @@
           <a:p>
             <a:r>
               <a:rPr lang="en-US" sz="2500" dirty="0"/>
-              <a:t>1) Hyperparameter</a:t>
-            </a:r>
-            <a:r>
-              <a:rPr lang="ko-KR" altLang="en-US" sz="2500" dirty="0"/>
-              <a:t>는 모델에만 국한되는 것이 아니다</a:t>
-            </a:r>
-            <a:r>
-              <a:rPr lang="en-US" altLang="ko-KR" sz="2500" dirty="0"/>
-              <a:t>.</a:t>
-            </a:r>
-            <a:r>
-              <a:rPr lang="ko-KR" altLang="en-US" sz="2500" dirty="0"/>
-              <a:t> </a:t>
-            </a:r>
-            <a:endParaRPr lang="en-US" sz="2500" dirty="0"/>
+              <a:t>2) Process</a:t>
+            </a:r>
           </a:p>
           <a:p>
             <a:pPr marL="285750" indent="-285750">
@@ -4262,84 +5115,12 @@
           </a:p>
         </p:txBody>
       </p:sp>
-      <p:sp>
-        <p:nvSpPr>
-          <p:cNvPr id="7" name="TextBox 6">
-            <a:extLst>
-              <a:ext uri="{FF2B5EF4-FFF2-40B4-BE49-F238E27FC236}">
-                <a16:creationId xmlns:a16="http://schemas.microsoft.com/office/drawing/2014/main" id="{BEE44A70-4F14-5B43-A934-581E324D7DD2}"/>
-              </a:ext>
-            </a:extLst>
-          </p:cNvPr>
-          <p:cNvSpPr txBox="1"/>
-          <p:nvPr/>
-        </p:nvSpPr>
-        <p:spPr>
-          <a:xfrm>
-            <a:off x="8327571" y="1804750"/>
-            <a:ext cx="3512000" cy="1708160"/>
-          </a:xfrm>
-          <a:prstGeom prst="rect">
-            <a:avLst/>
-          </a:prstGeom>
-          <a:noFill/>
-        </p:spPr>
-        <p:txBody>
-          <a:bodyPr wrap="square" rtlCol="0">
-            <a:spAutoFit/>
-          </a:bodyPr>
-          <a:lstStyle/>
-          <a:p>
-            <a:pPr marL="342900" indent="-342900" fontAlgn="base">
-              <a:buFont typeface="Arial" panose="020B0604020202020204" pitchFamily="34" charset="0"/>
-              <a:buChar char="•"/>
-            </a:pPr>
-            <a:r>
-              <a:rPr lang="en-US" sz="2000" dirty="0"/>
-              <a:t>Final Kaggle Score : </a:t>
-            </a:r>
-            <a:r>
-              <a:rPr lang="en-US" altLang="ko-KR" sz="2000" dirty="0"/>
-              <a:t>0.11554</a:t>
-            </a:r>
-          </a:p>
-          <a:p>
-            <a:pPr fontAlgn="base"/>
-            <a:endParaRPr lang="en-US" altLang="ko-KR" sz="2000" dirty="0"/>
-          </a:p>
-          <a:p>
-            <a:pPr marL="342900" indent="-342900" fontAlgn="base">
-              <a:buFont typeface="Arial" panose="020B0604020202020204" pitchFamily="34" charset="0"/>
-              <a:buChar char="•"/>
-            </a:pPr>
-            <a:r>
-              <a:rPr lang="en-US" altLang="ko-KR" sz="2000" b="1" u="sng" dirty="0"/>
-              <a:t>Top 8% </a:t>
-            </a:r>
-            <a:r>
-              <a:rPr lang="en-US" altLang="ko-KR" sz="2000" dirty="0"/>
-              <a:t>( 11/17, 2018 )</a:t>
-            </a:r>
-            <a:br>
-              <a:rPr lang="en-US" altLang="ko-KR" sz="2000" dirty="0"/>
-            </a:br>
-            <a:endParaRPr lang="en-US" sz="2000" dirty="0"/>
-          </a:p>
-          <a:p>
-            <a:pPr marL="285750" indent="-285750">
-              <a:buFont typeface="Arial" panose="020B0604020202020204" pitchFamily="34" charset="0"/>
-              <a:buChar char="•"/>
-            </a:pPr>
-            <a:endParaRPr lang="en-US" sz="2500" dirty="0"/>
-          </a:p>
-        </p:txBody>
-      </p:sp>
       <p:pic>
         <p:nvPicPr>
-          <p:cNvPr id="5" name="그림 4">
-            <a:extLst>
-              <a:ext uri="{FF2B5EF4-FFF2-40B4-BE49-F238E27FC236}">
-                <a16:creationId xmlns:a16="http://schemas.microsoft.com/office/drawing/2014/main" id="{2FA5A8A6-45F9-2840-B9E2-BFEAAF15FA68}"/>
+          <p:cNvPr id="8" name="그림 7">
+            <a:extLst>
+              <a:ext uri="{FF2B5EF4-FFF2-40B4-BE49-F238E27FC236}">
+                <a16:creationId xmlns:a16="http://schemas.microsoft.com/office/drawing/2014/main" id="{F5E368C3-8CA8-0D43-961A-DAF7B0455206}"/>
               </a:ext>
             </a:extLst>
           </p:cNvPr>
@@ -4356,130 +5137,20 @@
         </p:blipFill>
         <p:spPr>
           <a:xfrm>
-            <a:off x="650272" y="1578427"/>
-            <a:ext cx="7677299" cy="4050964"/>
+            <a:off x="341543" y="1619693"/>
+            <a:ext cx="11454466" cy="3091100"/>
           </a:xfrm>
           <a:prstGeom prst="rect">
             <a:avLst/>
           </a:prstGeom>
         </p:spPr>
       </p:pic>
-    </p:spTree>
-    <p:extLst>
-      <p:ext uri="{BB962C8B-B14F-4D97-AF65-F5344CB8AC3E}">
-        <p14:creationId xmlns:p14="http://schemas.microsoft.com/office/powerpoint/2010/main" val="3092518641"/>
-      </p:ext>
-    </p:extLst>
-  </p:cSld>
-  <p:clrMapOvr>
-    <a:masterClrMapping/>
-  </p:clrMapOvr>
-</p:sld>
-</file>
-
-<file path=ppt/slides/slide14.xml><?xml version="1.0" encoding="utf-8"?>
-<p:sld xmlns:a="http://schemas.openxmlformats.org/drawingml/2006/main" xmlns:r="http://schemas.openxmlformats.org/officeDocument/2006/relationships" xmlns:p="http://schemas.openxmlformats.org/presentationml/2006/main">
-  <p:cSld>
-    <p:spTree>
-      <p:nvGrpSpPr>
-        <p:cNvPr id="1" name=""/>
-        <p:cNvGrpSpPr/>
-        <p:nvPr/>
-      </p:nvGrpSpPr>
-      <p:grpSpPr>
-        <a:xfrm>
-          <a:off x="0" y="0"/>
-          <a:ext cx="0" cy="0"/>
-          <a:chOff x="0" y="0"/>
-          <a:chExt cx="0" cy="0"/>
-        </a:xfrm>
-      </p:grpSpPr>
-      <p:sp>
-        <p:nvSpPr>
-          <p:cNvPr id="2" name="Title 1">
-            <a:extLst>
-              <a:ext uri="{FF2B5EF4-FFF2-40B4-BE49-F238E27FC236}">
-                <a16:creationId xmlns:a16="http://schemas.microsoft.com/office/drawing/2014/main" id="{9E99C2AC-35AE-DA4C-AD02-FA4608CD24DC}"/>
-              </a:ext>
-            </a:extLst>
-          </p:cNvPr>
-          <p:cNvSpPr>
-            <a:spLocks noGrp="1"/>
-          </p:cNvSpPr>
-          <p:nvPr>
-            <p:ph type="title"/>
-          </p:nvPr>
-        </p:nvSpPr>
-        <p:spPr/>
-        <p:txBody>
-          <a:bodyPr/>
-          <a:lstStyle/>
-          <a:p>
-            <a:endParaRPr lang="en-US"/>
-          </a:p>
-        </p:txBody>
-      </p:sp>
-      <p:sp>
-        <p:nvSpPr>
-          <p:cNvPr id="3" name="Content Placeholder 2">
-            <a:extLst>
-              <a:ext uri="{FF2B5EF4-FFF2-40B4-BE49-F238E27FC236}">
-                <a16:creationId xmlns:a16="http://schemas.microsoft.com/office/drawing/2014/main" id="{F7ACC4E1-187F-7F41-BB09-68178C10D4A0}"/>
-              </a:ext>
-            </a:extLst>
-          </p:cNvPr>
-          <p:cNvSpPr>
-            <a:spLocks noGrp="1"/>
-          </p:cNvSpPr>
-          <p:nvPr>
-            <p:ph idx="1"/>
-          </p:nvPr>
-        </p:nvSpPr>
-        <p:spPr/>
-        <p:txBody>
-          <a:bodyPr/>
-          <a:lstStyle/>
-          <a:p>
-            <a:endParaRPr lang="en-US"/>
-          </a:p>
-        </p:txBody>
-      </p:sp>
-    </p:spTree>
-    <p:extLst>
-      <p:ext uri="{BB962C8B-B14F-4D97-AF65-F5344CB8AC3E}">
-        <p14:creationId xmlns:p14="http://schemas.microsoft.com/office/powerpoint/2010/main" val="813567303"/>
-      </p:ext>
-    </p:extLst>
-  </p:cSld>
-  <p:clrMapOvr>
-    <a:masterClrMapping/>
-  </p:clrMapOvr>
-</p:sld>
-</file>
-
-<file path=ppt/slides/slide2.xml><?xml version="1.0" encoding="utf-8"?>
-<p:sld xmlns:a="http://schemas.openxmlformats.org/drawingml/2006/main" xmlns:r="http://schemas.openxmlformats.org/officeDocument/2006/relationships" xmlns:p="http://schemas.openxmlformats.org/presentationml/2006/main">
-  <p:cSld>
-    <p:spTree>
-      <p:nvGrpSpPr>
-        <p:cNvPr id="1" name=""/>
-        <p:cNvGrpSpPr/>
-        <p:nvPr/>
-      </p:nvGrpSpPr>
-      <p:grpSpPr>
-        <a:xfrm>
-          <a:off x="0" y="0"/>
-          <a:ext cx="0" cy="0"/>
-          <a:chOff x="0" y="0"/>
-          <a:chExt cx="0" cy="0"/>
-        </a:xfrm>
-      </p:grpSpPr>
-      <p:sp>
-        <p:nvSpPr>
-          <p:cNvPr id="2" name="TextBox 1">
-            <a:extLst>
-              <a:ext uri="{FF2B5EF4-FFF2-40B4-BE49-F238E27FC236}">
-                <a16:creationId xmlns:a16="http://schemas.microsoft.com/office/drawing/2014/main" id="{E8DE0A38-F100-4848-9E50-E2D56070894C}"/>
+      <p:sp>
+        <p:nvSpPr>
+          <p:cNvPr id="9" name="TextBox 8">
+            <a:extLst>
+              <a:ext uri="{FF2B5EF4-FFF2-40B4-BE49-F238E27FC236}">
+                <a16:creationId xmlns:a16="http://schemas.microsoft.com/office/drawing/2014/main" id="{4DEE9636-219D-8344-8CCF-1FB9837E1B98}"/>
               </a:ext>
             </a:extLst>
           </p:cNvPr>
@@ -4488,8 +5159,8 @@
         </p:nvSpPr>
         <p:spPr>
           <a:xfrm>
-            <a:off x="642938" y="185738"/>
-            <a:ext cx="3055003" cy="630942"/>
+            <a:off x="341543" y="4895495"/>
+            <a:ext cx="11454466" cy="2339102"/>
           </a:xfrm>
           <a:prstGeom prst="rect">
             <a:avLst/>
@@ -4497,232 +5168,7 @@
           <a:noFill/>
         </p:spPr>
         <p:txBody>
-          <a:bodyPr wrap="none" rtlCol="0">
-            <a:spAutoFit/>
-          </a:bodyPr>
-          <a:lstStyle/>
-          <a:p>
-            <a:r>
-              <a:rPr lang="en-US" sz="3500" b="1" dirty="0"/>
-              <a:t>Project outline:</a:t>
-            </a:r>
-          </a:p>
-        </p:txBody>
-      </p:sp>
-      <p:sp>
-        <p:nvSpPr>
-          <p:cNvPr id="3" name="TextBox 2">
-            <a:extLst>
-              <a:ext uri="{FF2B5EF4-FFF2-40B4-BE49-F238E27FC236}">
-                <a16:creationId xmlns:a16="http://schemas.microsoft.com/office/drawing/2014/main" id="{DB406570-1361-B04C-82FE-E04A73C4D04F}"/>
-              </a:ext>
-            </a:extLst>
-          </p:cNvPr>
-          <p:cNvSpPr txBox="1"/>
-          <p:nvPr/>
-        </p:nvSpPr>
-        <p:spPr>
-          <a:xfrm>
-            <a:off x="1428749" y="1081833"/>
-            <a:ext cx="10329863" cy="5478423"/>
-          </a:xfrm>
-          <a:prstGeom prst="rect">
-            <a:avLst/>
-          </a:prstGeom>
-          <a:noFill/>
-        </p:spPr>
-        <p:txBody>
           <a:bodyPr wrap="square" rtlCol="0">
-            <a:spAutoFit/>
-          </a:bodyPr>
-          <a:lstStyle/>
-          <a:p>
-            <a:pPr marL="342900" indent="-342900">
-              <a:buFont typeface="Arial" panose="020B0604020202020204" pitchFamily="34" charset="0"/>
-              <a:buChar char="•"/>
-            </a:pPr>
-            <a:r>
-              <a:rPr lang="en-US" sz="2500" dirty="0"/>
-              <a:t>Why  this  project?</a:t>
-            </a:r>
-          </a:p>
-          <a:p>
-            <a:pPr marL="342900" indent="-342900">
-              <a:buFont typeface="Arial" panose="020B0604020202020204" pitchFamily="34" charset="0"/>
-              <a:buChar char="•"/>
-            </a:pPr>
-            <a:endParaRPr lang="en-US" sz="2500" dirty="0"/>
-          </a:p>
-          <a:p>
-            <a:pPr marL="342900" indent="-342900">
-              <a:buFont typeface="Arial" panose="020B0604020202020204" pitchFamily="34" charset="0"/>
-              <a:buChar char="•"/>
-            </a:pPr>
-            <a:r>
-              <a:rPr lang="en-US" sz="2500" dirty="0"/>
-              <a:t>Project structure and EDA processing</a:t>
-            </a:r>
-          </a:p>
-          <a:p>
-            <a:pPr marL="342900" indent="-342900">
-              <a:buFont typeface="Arial" panose="020B0604020202020204" pitchFamily="34" charset="0"/>
-              <a:buChar char="•"/>
-            </a:pPr>
-            <a:endParaRPr lang="en-US" sz="2500" dirty="0"/>
-          </a:p>
-          <a:p>
-            <a:pPr marL="342900" indent="-342900">
-              <a:buFont typeface="Arial" panose="020B0604020202020204" pitchFamily="34" charset="0"/>
-              <a:buChar char="•"/>
-            </a:pPr>
-            <a:r>
-              <a:rPr lang="en-US" sz="2500" dirty="0"/>
-              <a:t>Feature Engineering and different models used</a:t>
-            </a:r>
-          </a:p>
-          <a:p>
-            <a:endParaRPr lang="en-US" sz="2500" dirty="0"/>
-          </a:p>
-          <a:p>
-            <a:pPr marL="342900" indent="-342900">
-              <a:buFont typeface="Arial" panose="020B0604020202020204" pitchFamily="34" charset="0"/>
-              <a:buChar char="•"/>
-            </a:pPr>
-            <a:r>
-              <a:rPr lang="en-US" sz="2500" dirty="0"/>
-              <a:t>Model training and cross-validation</a:t>
-            </a:r>
-          </a:p>
-          <a:p>
-            <a:endParaRPr lang="en-US" sz="2500" dirty="0"/>
-          </a:p>
-          <a:p>
-            <a:pPr marL="342900" indent="-342900">
-              <a:buFont typeface="Arial" panose="020B0604020202020204" pitchFamily="34" charset="0"/>
-              <a:buChar char="•"/>
-            </a:pPr>
-            <a:r>
-              <a:rPr lang="en-US" sz="2500" dirty="0"/>
-              <a:t> Results</a:t>
-            </a:r>
-          </a:p>
-          <a:p>
-            <a:pPr marL="342900" indent="-342900">
-              <a:buFont typeface="Arial" panose="020B0604020202020204" pitchFamily="34" charset="0"/>
-              <a:buChar char="•"/>
-            </a:pPr>
-            <a:endParaRPr lang="en-US" sz="2500" dirty="0"/>
-          </a:p>
-          <a:p>
-            <a:pPr marL="342900" indent="-342900">
-              <a:buFont typeface="Arial" panose="020B0604020202020204" pitchFamily="34" charset="0"/>
-              <a:buChar char="•"/>
-            </a:pPr>
-            <a:r>
-              <a:rPr lang="en-US" sz="2500" dirty="0"/>
-              <a:t> Conclusion and future direction</a:t>
-            </a:r>
-          </a:p>
-          <a:p>
-            <a:endParaRPr lang="en-US" sz="2500" dirty="0"/>
-          </a:p>
-          <a:p>
-            <a:endParaRPr lang="en-US" sz="2500" dirty="0"/>
-          </a:p>
-          <a:p>
-            <a:endParaRPr lang="en-US" sz="2500" dirty="0"/>
-          </a:p>
-        </p:txBody>
-      </p:sp>
-    </p:spTree>
-    <p:extLst>
-      <p:ext uri="{BB962C8B-B14F-4D97-AF65-F5344CB8AC3E}">
-        <p14:creationId xmlns:p14="http://schemas.microsoft.com/office/powerpoint/2010/main" val="529177583"/>
-      </p:ext>
-    </p:extLst>
-  </p:cSld>
-  <p:clrMapOvr>
-    <a:masterClrMapping/>
-  </p:clrMapOvr>
-</p:sld>
-</file>
-
-<file path=ppt/slides/slide3.xml><?xml version="1.0" encoding="utf-8"?>
-<p:sld xmlns:a="http://schemas.openxmlformats.org/drawingml/2006/main" xmlns:r="http://schemas.openxmlformats.org/officeDocument/2006/relationships" xmlns:p="http://schemas.openxmlformats.org/presentationml/2006/main">
-  <p:cSld>
-    <p:spTree>
-      <p:nvGrpSpPr>
-        <p:cNvPr id="1" name=""/>
-        <p:cNvGrpSpPr/>
-        <p:nvPr/>
-      </p:nvGrpSpPr>
-      <p:grpSpPr>
-        <a:xfrm>
-          <a:off x="0" y="0"/>
-          <a:ext cx="0" cy="0"/>
-          <a:chOff x="0" y="0"/>
-          <a:chExt cx="0" cy="0"/>
-        </a:xfrm>
-      </p:grpSpPr>
-      <p:sp>
-        <p:nvSpPr>
-          <p:cNvPr id="4" name="TextBox 3">
-            <a:extLst>
-              <a:ext uri="{FF2B5EF4-FFF2-40B4-BE49-F238E27FC236}">
-                <a16:creationId xmlns:a16="http://schemas.microsoft.com/office/drawing/2014/main" id="{32B57168-BBF7-3A4D-BE5B-88543E8B5FA3}"/>
-              </a:ext>
-            </a:extLst>
-          </p:cNvPr>
-          <p:cNvSpPr txBox="1"/>
-          <p:nvPr/>
-        </p:nvSpPr>
-        <p:spPr>
-          <a:xfrm>
-            <a:off x="428629" y="442917"/>
-            <a:ext cx="3455690" cy="630942"/>
-          </a:xfrm>
-          <a:prstGeom prst="rect">
-            <a:avLst/>
-          </a:prstGeom>
-          <a:noFill/>
-        </p:spPr>
-        <p:txBody>
-          <a:bodyPr wrap="none" rtlCol="0">
-            <a:spAutoFit/>
-          </a:bodyPr>
-          <a:lstStyle/>
-          <a:p>
-            <a:r>
-              <a:rPr lang="en-US" sz="3500" b="1" dirty="0"/>
-              <a:t>Why this project?</a:t>
-            </a:r>
-          </a:p>
-        </p:txBody>
-      </p:sp>
-      <p:sp>
-        <p:nvSpPr>
-          <p:cNvPr id="5" name="TextBox 4">
-            <a:extLst>
-              <a:ext uri="{FF2B5EF4-FFF2-40B4-BE49-F238E27FC236}">
-                <a16:creationId xmlns:a16="http://schemas.microsoft.com/office/drawing/2014/main" id="{D50DDA60-0194-0A4B-B7C4-28EA0234EF58}"/>
-              </a:ext>
-            </a:extLst>
-          </p:cNvPr>
-          <p:cNvSpPr txBox="1"/>
-          <p:nvPr/>
-        </p:nvSpPr>
-        <p:spPr>
-          <a:xfrm>
-            <a:off x="835329" y="1400176"/>
-            <a:ext cx="10143931" cy="5863144"/>
-          </a:xfrm>
-          <a:prstGeom prst="rect">
-            <a:avLst/>
-          </a:prstGeom>
-          <a:noFill/>
-        </p:spPr>
-        <p:txBody>
-          <a:bodyPr wrap="none" rtlCol="0">
             <a:spAutoFit/>
           </a:bodyPr>
           <a:lstStyle/>
@@ -4732,9 +5178,47 @@
               <a:buChar char="•"/>
             </a:pPr>
             <a:r>
-              <a:rPr lang="en-US" sz="2500" dirty="0"/>
-              <a:t>House is a lifetime investment</a:t>
-            </a:r>
+              <a:rPr lang="en-US" sz="2400" dirty="0"/>
+              <a:t>Workflow for Model selection</a:t>
+            </a:r>
+          </a:p>
+          <a:p>
+            <a:pPr marL="742950" lvl="1" indent="-285750">
+              <a:buFont typeface="Arial" panose="020B0604020202020204" pitchFamily="34" charset="0"/>
+              <a:buChar char="•"/>
+            </a:pPr>
+            <a:r>
+              <a:rPr lang="en-US" sz="2400" dirty="0"/>
+              <a:t>Used Various Algorithm</a:t>
+            </a:r>
+          </a:p>
+          <a:p>
+            <a:pPr marL="742950" lvl="1" indent="-285750">
+              <a:buFont typeface="Arial" panose="020B0604020202020204" pitchFamily="34" charset="0"/>
+              <a:buChar char="•"/>
+            </a:pPr>
+            <a:r>
+              <a:rPr lang="en-US" sz="2400" dirty="0" err="1"/>
+              <a:t>GridSearch</a:t>
+            </a:r>
+            <a:r>
+              <a:rPr lang="en-US" sz="2400" dirty="0"/>
+              <a:t> for finding Hyperparameter </a:t>
+            </a:r>
+          </a:p>
+          <a:p>
+            <a:pPr marL="742950" lvl="1" indent="-285750">
+              <a:buFont typeface="Arial" panose="020B0604020202020204" pitchFamily="34" charset="0"/>
+              <a:buChar char="•"/>
+            </a:pPr>
+            <a:r>
+              <a:rPr lang="en-US" sz="2400" dirty="0"/>
+              <a:t>Made a Model ( Stacking / Averaged )  </a:t>
+            </a:r>
+            <a:endParaRPr lang="en-US" sz="2500" dirty="0"/>
+          </a:p>
+          <a:p>
+            <a:endParaRPr lang="en-US" sz="2500" dirty="0"/>
           </a:p>
           <a:p>
             <a:pPr marL="285750" indent="-285750">
@@ -4743,95 +5227,12 @@
             </a:pPr>
             <a:endParaRPr lang="en-US" sz="2500" dirty="0"/>
           </a:p>
-          <a:p>
-            <a:pPr marL="285750" indent="-285750">
-              <a:buFont typeface="Arial" panose="020B0604020202020204" pitchFamily="34" charset="0"/>
-              <a:buChar char="•"/>
-            </a:pPr>
-            <a:r>
-              <a:rPr lang="en-US" sz="2500" dirty="0"/>
-              <a:t>How the price of house are affected by different features in the house?</a:t>
-            </a:r>
-          </a:p>
-          <a:p>
-            <a:pPr marL="285750" indent="-285750">
-              <a:buFont typeface="Arial" panose="020B0604020202020204" pitchFamily="34" charset="0"/>
-              <a:buChar char="•"/>
-            </a:pPr>
-            <a:endParaRPr lang="en-US" sz="2500" dirty="0"/>
-          </a:p>
-          <a:p>
-            <a:pPr marL="285750" indent="-285750">
-              <a:buFont typeface="Arial" panose="020B0604020202020204" pitchFamily="34" charset="0"/>
-              <a:buChar char="•"/>
-            </a:pPr>
-            <a:r>
-              <a:rPr lang="en-US" sz="2500" dirty="0"/>
-              <a:t>People want to know the actual price of house on the basis of features </a:t>
-            </a:r>
-          </a:p>
-          <a:p>
-            <a:r>
-              <a:rPr lang="en-US" sz="2500" dirty="0"/>
-              <a:t>    before reaching out to agent</a:t>
-            </a:r>
-          </a:p>
-          <a:p>
-            <a:endParaRPr lang="en-US" sz="2500" dirty="0"/>
-          </a:p>
-          <a:p>
-            <a:pPr marL="342900" indent="-342900">
-              <a:buFont typeface="Arial" panose="020B0604020202020204" pitchFamily="34" charset="0"/>
-              <a:buChar char="•"/>
-            </a:pPr>
-            <a:r>
-              <a:rPr lang="en-US" sz="2500" dirty="0"/>
-              <a:t>How we did this and how can we apply to predict the real world problem?</a:t>
-            </a:r>
-          </a:p>
-          <a:p>
-            <a:pPr marL="342900" indent="-342900">
-              <a:buFont typeface="Arial" panose="020B0604020202020204" pitchFamily="34" charset="0"/>
-              <a:buChar char="•"/>
-            </a:pPr>
-            <a:endParaRPr lang="en-US" sz="2500" dirty="0"/>
-          </a:p>
-          <a:p>
-            <a:endParaRPr lang="en-US" sz="2500" dirty="0"/>
-          </a:p>
-          <a:p>
-            <a:endParaRPr lang="en-US" sz="2500" dirty="0"/>
-          </a:p>
-          <a:p>
-            <a:pPr marL="342900" indent="-342900">
-              <a:buFont typeface="Arial" panose="020B0604020202020204" pitchFamily="34" charset="0"/>
-              <a:buChar char="•"/>
-            </a:pPr>
-            <a:endParaRPr lang="en-US" sz="2500" dirty="0"/>
-          </a:p>
-          <a:p>
-            <a:pPr marL="342900" indent="-342900">
-              <a:buFont typeface="Arial" panose="020B0604020202020204" pitchFamily="34" charset="0"/>
-              <a:buChar char="•"/>
-            </a:pPr>
-            <a:endParaRPr lang="en-US" sz="2500" dirty="0"/>
-          </a:p>
-          <a:p>
-            <a:endParaRPr lang="en-US" sz="2500" dirty="0"/>
-          </a:p>
-          <a:p>
-            <a:pPr marL="285750" indent="-285750">
-              <a:buFont typeface="Arial" panose="020B0604020202020204" pitchFamily="34" charset="0"/>
-              <a:buChar char="•"/>
-            </a:pPr>
-            <a:endParaRPr lang="en-US" sz="2500" dirty="0"/>
-          </a:p>
         </p:txBody>
       </p:sp>
     </p:spTree>
     <p:extLst>
       <p:ext uri="{BB962C8B-B14F-4D97-AF65-F5344CB8AC3E}">
-        <p14:creationId xmlns:p14="http://schemas.microsoft.com/office/powerpoint/2010/main" val="250892496"/>
+        <p14:creationId xmlns:p14="http://schemas.microsoft.com/office/powerpoint/2010/main" val="1989933362"/>
       </p:ext>
     </p:extLst>
   </p:cSld>
@@ -4842,271 +5243,6 @@
 </file>
 
 <file path=ppt/slides/slide4.xml><?xml version="1.0" encoding="utf-8"?>
-<p:sld xmlns:a="http://schemas.openxmlformats.org/drawingml/2006/main" xmlns:r="http://schemas.openxmlformats.org/officeDocument/2006/relationships" xmlns:p="http://schemas.openxmlformats.org/presentationml/2006/main">
-  <p:cSld>
-    <p:spTree>
-      <p:nvGrpSpPr>
-        <p:cNvPr id="1" name=""/>
-        <p:cNvGrpSpPr/>
-        <p:nvPr/>
-      </p:nvGrpSpPr>
-      <p:grpSpPr>
-        <a:xfrm>
-          <a:off x="0" y="0"/>
-          <a:ext cx="0" cy="0"/>
-          <a:chOff x="0" y="0"/>
-          <a:chExt cx="0" cy="0"/>
-        </a:xfrm>
-      </p:grpSpPr>
-      <p:sp>
-        <p:nvSpPr>
-          <p:cNvPr id="2" name="Rectangle 1">
-            <a:extLst>
-              <a:ext uri="{FF2B5EF4-FFF2-40B4-BE49-F238E27FC236}">
-                <a16:creationId xmlns:a16="http://schemas.microsoft.com/office/drawing/2014/main" id="{1F1A10CE-F98D-4647-82FA-A7F07748F059}"/>
-              </a:ext>
-            </a:extLst>
-          </p:cNvPr>
-          <p:cNvSpPr/>
-          <p:nvPr/>
-        </p:nvSpPr>
-        <p:spPr>
-          <a:xfrm>
-            <a:off x="210259" y="215384"/>
-            <a:ext cx="7169463" cy="630942"/>
-          </a:xfrm>
-          <a:prstGeom prst="rect">
-            <a:avLst/>
-          </a:prstGeom>
-        </p:spPr>
-        <p:txBody>
-          <a:bodyPr wrap="none">
-            <a:spAutoFit/>
-          </a:bodyPr>
-          <a:lstStyle/>
-          <a:p>
-            <a:r>
-              <a:rPr lang="en-US" sz="3500" b="1" dirty="0"/>
-              <a:t>Project structure and EDA processing:</a:t>
-            </a:r>
-          </a:p>
-        </p:txBody>
-      </p:sp>
-      <p:sp>
-        <p:nvSpPr>
-          <p:cNvPr id="3" name="Rectangle 2">
-            <a:extLst>
-              <a:ext uri="{FF2B5EF4-FFF2-40B4-BE49-F238E27FC236}">
-                <a16:creationId xmlns:a16="http://schemas.microsoft.com/office/drawing/2014/main" id="{BA94E97C-1A1C-9549-B624-E4473560E894}"/>
-              </a:ext>
-            </a:extLst>
-          </p:cNvPr>
-          <p:cNvSpPr/>
-          <p:nvPr/>
-        </p:nvSpPr>
-        <p:spPr>
-          <a:xfrm>
-            <a:off x="1305569" y="990558"/>
-            <a:ext cx="5245988" cy="861774"/>
-          </a:xfrm>
-          <a:prstGeom prst="rect">
-            <a:avLst/>
-          </a:prstGeom>
-        </p:spPr>
-        <p:txBody>
-          <a:bodyPr wrap="none">
-            <a:spAutoFit/>
-          </a:bodyPr>
-          <a:lstStyle/>
-          <a:p>
-            <a:r>
-              <a:rPr lang="en-US" sz="2500" dirty="0"/>
-              <a:t>We built two pipe lines for this project:</a:t>
-            </a:r>
-          </a:p>
-          <a:p>
-            <a:endParaRPr lang="en-US" sz="2500" dirty="0"/>
-          </a:p>
-        </p:txBody>
-      </p:sp>
-      <p:sp>
-        <p:nvSpPr>
-          <p:cNvPr id="4" name="Rectangle 3">
-            <a:extLst>
-              <a:ext uri="{FF2B5EF4-FFF2-40B4-BE49-F238E27FC236}">
-                <a16:creationId xmlns:a16="http://schemas.microsoft.com/office/drawing/2014/main" id="{F22B9164-8FA9-CC4F-B658-D6B7C193F28E}"/>
-              </a:ext>
-            </a:extLst>
-          </p:cNvPr>
-          <p:cNvSpPr/>
-          <p:nvPr/>
-        </p:nvSpPr>
-        <p:spPr>
-          <a:xfrm>
-            <a:off x="1551940" y="1565677"/>
-            <a:ext cx="2940933" cy="861774"/>
-          </a:xfrm>
-          <a:prstGeom prst="rect">
-            <a:avLst/>
-          </a:prstGeom>
-        </p:spPr>
-        <p:txBody>
-          <a:bodyPr wrap="none">
-            <a:spAutoFit/>
-          </a:bodyPr>
-          <a:lstStyle/>
-          <a:p>
-            <a:r>
-              <a:rPr lang="en-US" sz="2500" dirty="0"/>
-              <a:t>a) Transform pipeline</a:t>
-            </a:r>
-          </a:p>
-          <a:p>
-            <a:endParaRPr lang="en-US" sz="2500" dirty="0"/>
-          </a:p>
-        </p:txBody>
-      </p:sp>
-      <p:pic>
-        <p:nvPicPr>
-          <p:cNvPr id="7" name="Picture 6">
-            <a:extLst>
-              <a:ext uri="{FF2B5EF4-FFF2-40B4-BE49-F238E27FC236}">
-                <a16:creationId xmlns:a16="http://schemas.microsoft.com/office/drawing/2014/main" id="{4777B2AB-BE2B-A44F-9008-AAAF33BA30BF}"/>
-              </a:ext>
-            </a:extLst>
-          </p:cNvPr>
-          <p:cNvPicPr>
-            <a:picLocks noChangeAspect="1"/>
-          </p:cNvPicPr>
-          <p:nvPr/>
-        </p:nvPicPr>
-        <p:blipFill>
-          <a:blip r:embed="rId2"/>
-          <a:stretch>
-            <a:fillRect/>
-          </a:stretch>
-        </p:blipFill>
-        <p:spPr>
-          <a:xfrm>
-            <a:off x="1646238" y="2159001"/>
-            <a:ext cx="7327900" cy="2997200"/>
-          </a:xfrm>
-          <a:prstGeom prst="rect">
-            <a:avLst/>
-          </a:prstGeom>
-        </p:spPr>
-      </p:pic>
-    </p:spTree>
-    <p:extLst>
-      <p:ext uri="{BB962C8B-B14F-4D97-AF65-F5344CB8AC3E}">
-        <p14:creationId xmlns:p14="http://schemas.microsoft.com/office/powerpoint/2010/main" val="3387996370"/>
-      </p:ext>
-    </p:extLst>
-  </p:cSld>
-  <p:clrMapOvr>
-    <a:masterClrMapping/>
-  </p:clrMapOvr>
-</p:sld>
-</file>
-
-<file path=ppt/slides/slide5.xml><?xml version="1.0" encoding="utf-8"?>
-<p:sld xmlns:a="http://schemas.openxmlformats.org/drawingml/2006/main" xmlns:r="http://schemas.openxmlformats.org/officeDocument/2006/relationships" xmlns:p="http://schemas.openxmlformats.org/presentationml/2006/main">
-  <p:cSld>
-    <p:spTree>
-      <p:nvGrpSpPr>
-        <p:cNvPr id="1" name=""/>
-        <p:cNvGrpSpPr/>
-        <p:nvPr/>
-      </p:nvGrpSpPr>
-      <p:grpSpPr>
-        <a:xfrm>
-          <a:off x="0" y="0"/>
-          <a:ext cx="0" cy="0"/>
-          <a:chOff x="0" y="0"/>
-          <a:chExt cx="0" cy="0"/>
-        </a:xfrm>
-      </p:grpSpPr>
-      <p:sp>
-        <p:nvSpPr>
-          <p:cNvPr id="2" name="Rectangle 1">
-            <a:extLst>
-              <a:ext uri="{FF2B5EF4-FFF2-40B4-BE49-F238E27FC236}">
-                <a16:creationId xmlns:a16="http://schemas.microsoft.com/office/drawing/2014/main" id="{D984E803-506C-E548-9C72-AC0DB2DC7271}"/>
-              </a:ext>
-            </a:extLst>
-          </p:cNvPr>
-          <p:cNvSpPr/>
-          <p:nvPr/>
-        </p:nvSpPr>
-        <p:spPr>
-          <a:xfrm>
-            <a:off x="2709227" y="679858"/>
-            <a:ext cx="2486578" cy="861774"/>
-          </a:xfrm>
-          <a:prstGeom prst="rect">
-            <a:avLst/>
-          </a:prstGeom>
-        </p:spPr>
-        <p:txBody>
-          <a:bodyPr wrap="none">
-            <a:spAutoFit/>
-          </a:bodyPr>
-          <a:lstStyle/>
-          <a:p>
-            <a:r>
-              <a:rPr lang="en-US" sz="2500" dirty="0"/>
-              <a:t>b) Model pipeline</a:t>
-            </a:r>
-          </a:p>
-          <a:p>
-            <a:endParaRPr lang="en-US" sz="2500" dirty="0"/>
-          </a:p>
-        </p:txBody>
-      </p:sp>
-      <p:pic>
-        <p:nvPicPr>
-          <p:cNvPr id="7" name="Picture 6">
-            <a:extLst>
-              <a:ext uri="{FF2B5EF4-FFF2-40B4-BE49-F238E27FC236}">
-                <a16:creationId xmlns:a16="http://schemas.microsoft.com/office/drawing/2014/main" id="{E61E04E8-88D7-CB4D-A915-8DBA0118E06E}"/>
-              </a:ext>
-            </a:extLst>
-          </p:cNvPr>
-          <p:cNvPicPr>
-            <a:picLocks noChangeAspect="1"/>
-          </p:cNvPicPr>
-          <p:nvPr/>
-        </p:nvPicPr>
-        <p:blipFill>
-          <a:blip r:embed="rId2"/>
-          <a:stretch>
-            <a:fillRect/>
-          </a:stretch>
-        </p:blipFill>
-        <p:spPr>
-          <a:xfrm>
-            <a:off x="755650" y="2133600"/>
-            <a:ext cx="10680700" cy="2590800"/>
-          </a:xfrm>
-          <a:prstGeom prst="rect">
-            <a:avLst/>
-          </a:prstGeom>
-        </p:spPr>
-      </p:pic>
-    </p:spTree>
-    <p:extLst>
-      <p:ext uri="{BB962C8B-B14F-4D97-AF65-F5344CB8AC3E}">
-        <p14:creationId xmlns:p14="http://schemas.microsoft.com/office/powerpoint/2010/main" val="273660832"/>
-      </p:ext>
-    </p:extLst>
-  </p:cSld>
-  <p:clrMapOvr>
-    <a:masterClrMapping/>
-  </p:clrMapOvr>
-</p:sld>
-</file>
-
-<file path=ppt/slides/slide6.xml><?xml version="1.0" encoding="utf-8"?>
 <p:sld xmlns:a="http://schemas.openxmlformats.org/drawingml/2006/main" xmlns:r="http://schemas.openxmlformats.org/officeDocument/2006/relationships" xmlns:p="http://schemas.openxmlformats.org/presentationml/2006/main">
   <p:cSld>
     <p:spTree>
@@ -5218,7 +5354,7 @@
         <p:spPr>
           <a:xfrm>
             <a:off x="650272" y="942976"/>
-            <a:ext cx="10289871" cy="5155257"/>
+            <a:ext cx="10289871" cy="1246495"/>
           </a:xfrm>
           <a:prstGeom prst="rect">
             <a:avLst/>
@@ -5233,134 +5369,273 @@
           <a:p>
             <a:r>
               <a:rPr lang="en-US" sz="2500" dirty="0"/>
-              <a:t>1) Model Selection Concept </a:t>
-            </a:r>
-          </a:p>
-          <a:p>
-            <a:pPr marL="457200" indent="-457200">
-              <a:buAutoNum type="arabicParenR"/>
-            </a:pPr>
+              <a:t>3) Stacking Regression</a:t>
+            </a:r>
+          </a:p>
+          <a:p>
+            <a:r>
+              <a:rPr lang="en-US" sz="2500" dirty="0"/>
+              <a:t>     : </a:t>
+            </a:r>
+            <a:r>
+              <a:rPr lang="en-US" altLang="ko-KR" dirty="0"/>
+              <a:t>Two heads are better than one</a:t>
+            </a:r>
             <a:endParaRPr lang="en-US" sz="2500" dirty="0"/>
           </a:p>
           <a:p>
-            <a:pPr marL="971550" lvl="1" indent="-514350">
-              <a:buFont typeface="+mj-lt"/>
-              <a:buAutoNum type="romanUcPeriod"/>
-            </a:pPr>
-            <a:r>
-              <a:rPr lang="en-US" sz="2800" dirty="0"/>
-              <a:t>Start with Lasso ( Test / Feature Selection )</a:t>
-            </a:r>
-          </a:p>
-          <a:p>
-            <a:pPr marL="1371600" lvl="2" indent="-457200">
+            <a:pPr marL="285750" indent="-285750">
               <a:buFont typeface="Arial" panose="020B0604020202020204" pitchFamily="34" charset="0"/>
               <a:buChar char="•"/>
             </a:pPr>
-            <a:r>
-              <a:rPr lang="en-US" sz="2500" dirty="0"/>
-              <a:t>Fast and Good result  </a:t>
-            </a:r>
-          </a:p>
-          <a:p>
-            <a:pPr marL="1371600" lvl="2" indent="-457200">
+            <a:endParaRPr lang="en-US" sz="2500" dirty="0"/>
+          </a:p>
+        </p:txBody>
+      </p:sp>
+      <p:pic>
+        <p:nvPicPr>
+          <p:cNvPr id="5" name="그림 4">
+            <a:extLst>
+              <a:ext uri="{FF2B5EF4-FFF2-40B4-BE49-F238E27FC236}">
+                <a16:creationId xmlns:a16="http://schemas.microsoft.com/office/drawing/2014/main" id="{7D1BCD3E-C531-C44E-84C6-1C93EFAA6409}"/>
+              </a:ext>
+            </a:extLst>
+          </p:cNvPr>
+          <p:cNvPicPr>
+            <a:picLocks noChangeAspect="1"/>
+          </p:cNvPicPr>
+          <p:nvPr/>
+        </p:nvPicPr>
+        <p:blipFill>
+          <a:blip r:embed="rId2"/>
+          <a:stretch>
+            <a:fillRect/>
+          </a:stretch>
+        </p:blipFill>
+        <p:spPr>
+          <a:xfrm>
+            <a:off x="711204" y="1804750"/>
+            <a:ext cx="5084003" cy="4204418"/>
+          </a:xfrm>
+          <a:prstGeom prst="rect">
+            <a:avLst/>
+          </a:prstGeom>
+          <a:ln>
+            <a:solidFill>
+              <a:schemeClr val="tx1"/>
+            </a:solidFill>
+          </a:ln>
+        </p:spPr>
+      </p:pic>
+      <p:sp>
+        <p:nvSpPr>
+          <p:cNvPr id="7" name="TextBox 6">
+            <a:extLst>
+              <a:ext uri="{FF2B5EF4-FFF2-40B4-BE49-F238E27FC236}">
+                <a16:creationId xmlns:a16="http://schemas.microsoft.com/office/drawing/2014/main" id="{A695EBE5-D2FE-8B45-9074-DD85E63A0FF9}"/>
+              </a:ext>
+            </a:extLst>
+          </p:cNvPr>
+          <p:cNvSpPr txBox="1"/>
+          <p:nvPr/>
+        </p:nvSpPr>
+        <p:spPr>
+          <a:xfrm>
+            <a:off x="6174157" y="1804750"/>
+            <a:ext cx="5821900" cy="3770263"/>
+          </a:xfrm>
+          <a:prstGeom prst="rect">
+            <a:avLst/>
+          </a:prstGeom>
+          <a:noFill/>
+        </p:spPr>
+        <p:txBody>
+          <a:bodyPr wrap="square" rtlCol="0">
+            <a:spAutoFit/>
+          </a:bodyPr>
+          <a:lstStyle/>
+          <a:p>
+            <a:pPr marL="285750" indent="-285750">
               <a:buFont typeface="Arial" panose="020B0604020202020204" pitchFamily="34" charset="0"/>
               <a:buChar char="•"/>
             </a:pPr>
             <a:r>
-              <a:rPr lang="en-US" sz="2500" dirty="0"/>
-              <a:t>A few Parameter</a:t>
-            </a:r>
-          </a:p>
-          <a:p>
-            <a:pPr lvl="1"/>
-            <a:endParaRPr lang="en-US" sz="2500" dirty="0"/>
-          </a:p>
-          <a:p>
-            <a:pPr marL="971550" lvl="1" indent="-514350">
-              <a:buFont typeface="+mj-lt"/>
-              <a:buAutoNum type="romanUcPeriod" startAt="2"/>
-            </a:pPr>
-            <a:r>
-              <a:rPr lang="en-US" sz="2800" dirty="0"/>
-              <a:t>Add </a:t>
-            </a:r>
-            <a:r>
-              <a:rPr lang="en-US" altLang="ko-KR" sz="2800" dirty="0"/>
-              <a:t>Supervised Learning ML </a:t>
-            </a:r>
-          </a:p>
-          <a:p>
-            <a:pPr marL="1371600" lvl="2" indent="-457200">
+              <a:rPr lang="en-US" sz="2400" dirty="0"/>
+              <a:t>Stacking is a method that combines </a:t>
+            </a:r>
+          </a:p>
+          <a:p>
+            <a:r>
+              <a:rPr lang="ko-KR" altLang="en-US" sz="2400" dirty="0"/>
+              <a:t> </a:t>
+            </a:r>
+            <a:r>
+              <a:rPr lang="en-US" sz="2400" dirty="0"/>
+              <a:t>predictions of several different models</a:t>
+            </a:r>
+          </a:p>
+          <a:p>
+            <a:endParaRPr lang="en-US" sz="2400" dirty="0"/>
+          </a:p>
+          <a:p>
+            <a:pPr marL="342900" indent="-342900">
               <a:buFont typeface="Arial" panose="020B0604020202020204" pitchFamily="34" charset="0"/>
               <a:buChar char="•"/>
             </a:pPr>
             <a:r>
-              <a:rPr lang="en-US" altLang="ko-KR" sz="2500" dirty="0"/>
-              <a:t>Ridge / </a:t>
-            </a:r>
-            <a:r>
-              <a:rPr lang="en-US" altLang="ko-KR" sz="2500" dirty="0" err="1"/>
-              <a:t>RandomForest</a:t>
-            </a:r>
-            <a:r>
-              <a:rPr lang="en-US" altLang="ko-KR" sz="2500" dirty="0"/>
-              <a:t>  / Boost .. </a:t>
-            </a:r>
-          </a:p>
-          <a:p>
-            <a:pPr marL="1371600" lvl="2" indent="-457200">
+              <a:rPr lang="en-US" altLang="ko-KR" sz="2400" dirty="0"/>
+              <a:t>Various ML Algorithms can be mixed</a:t>
+            </a:r>
+          </a:p>
+          <a:p>
+            <a:pPr marL="342900" indent="-342900">
               <a:buFont typeface="Arial" panose="020B0604020202020204" pitchFamily="34" charset="0"/>
               <a:buChar char="•"/>
             </a:pPr>
-            <a:r>
-              <a:rPr lang="en-US" altLang="ko-KR" sz="2400" dirty="0"/>
-              <a:t>Comparison of results between various algorithms</a:t>
-            </a:r>
-          </a:p>
-          <a:p>
-            <a:pPr marL="1371600" lvl="2" indent="-457200">
+            <a:endParaRPr lang="en-US" sz="2400" dirty="0"/>
+          </a:p>
+          <a:p>
+            <a:pPr marL="342900" indent="-342900">
               <a:buFont typeface="Arial" panose="020B0604020202020204" pitchFamily="34" charset="0"/>
               <a:buChar char="•"/>
             </a:pPr>
-            <a:endParaRPr lang="en-US" altLang="ko-KR" sz="2400" dirty="0"/>
-          </a:p>
-          <a:p>
-            <a:pPr marL="971550" lvl="1" indent="-514350">
-              <a:buFont typeface="+mj-lt"/>
-              <a:buAutoNum type="romanUcPeriod" startAt="3"/>
-            </a:pPr>
-            <a:r>
-              <a:rPr lang="en-US" altLang="ko-KR" sz="2800" dirty="0"/>
-              <a:t>Make Stacking / Average Model </a:t>
-            </a:r>
-          </a:p>
-          <a:p>
-            <a:pPr marL="1257300" lvl="2" indent="-342900">
+            <a:r>
+              <a:rPr lang="en-US" sz="2400" dirty="0"/>
+              <a:t>Meta Regressor </a:t>
+            </a:r>
+          </a:p>
+          <a:p>
+            <a:pPr marL="800100" lvl="1" indent="-342900">
               <a:buFont typeface="Arial" panose="020B0604020202020204" pitchFamily="34" charset="0"/>
               <a:buChar char="•"/>
             </a:pPr>
             <a:r>
-              <a:rPr lang="ko-KR" altLang="en-US" sz="2500" dirty="0"/>
-              <a:t> </a:t>
-            </a:r>
-            <a:r>
-              <a:rPr lang="en-US" altLang="ko-KR" sz="2500" dirty="0"/>
-              <a:t>To reduce residual, Make a Integrated model</a:t>
-            </a:r>
-          </a:p>
-          <a:p>
-            <a:pPr marL="914400" lvl="1" indent="-457200">
-              <a:buAutoNum type="arabicParenR"/>
+              <a:rPr lang="en-US" altLang="ko-KR" sz="2000" dirty="0"/>
+              <a:t>An algorithm that combines different models</a:t>
+            </a:r>
+            <a:endParaRPr lang="en-US" sz="2000" dirty="0"/>
+          </a:p>
+          <a:p>
+            <a:pPr marL="342900" indent="-342900">
+              <a:buFont typeface="Arial" panose="020B0604020202020204" pitchFamily="34" charset="0"/>
+              <a:buChar char="•"/>
             </a:pPr>
             <a:endParaRPr lang="en-US" sz="2500" dirty="0"/>
           </a:p>
-        </p:txBody>
-      </p:sp>
+          <a:p>
+            <a:endParaRPr lang="en-US" sz="2500" dirty="0"/>
+          </a:p>
+          <a:p>
+            <a:pPr marL="285750" indent="-285750">
+              <a:buFont typeface="Arial" panose="020B0604020202020204" pitchFamily="34" charset="0"/>
+              <a:buChar char="•"/>
+            </a:pPr>
+            <a:endParaRPr lang="en-US" sz="2500" dirty="0"/>
+          </a:p>
+        </p:txBody>
+      </p:sp>
+      <p:sp>
+        <p:nvSpPr>
+          <p:cNvPr id="6" name="TextBox 5">
+            <a:extLst>
+              <a:ext uri="{FF2B5EF4-FFF2-40B4-BE49-F238E27FC236}">
+                <a16:creationId xmlns:a16="http://schemas.microsoft.com/office/drawing/2014/main" id="{C60B0A5F-3475-EF46-94A8-7507B0AB651B}"/>
+              </a:ext>
+            </a:extLst>
+          </p:cNvPr>
+          <p:cNvSpPr txBox="1"/>
+          <p:nvPr/>
+        </p:nvSpPr>
+        <p:spPr>
+          <a:xfrm>
+            <a:off x="865607" y="6020307"/>
+            <a:ext cx="4775196" cy="261610"/>
+          </a:xfrm>
+          <a:prstGeom prst="rect">
+            <a:avLst/>
+          </a:prstGeom>
+          <a:noFill/>
+        </p:spPr>
+        <p:txBody>
+          <a:bodyPr wrap="square" rtlCol="0">
+            <a:spAutoFit/>
+          </a:bodyPr>
+          <a:lstStyle/>
+          <a:p>
+            <a:r>
+              <a:rPr kumimoji="1" lang="en-US" altLang="ko-KR" sz="1100" dirty="0"/>
+              <a:t>&lt;http://</a:t>
+            </a:r>
+            <a:r>
+              <a:rPr kumimoji="1" lang="en-US" altLang="ko-KR" sz="1100" dirty="0" err="1"/>
+              <a:t>rasbt.github.io</a:t>
+            </a:r>
+            <a:r>
+              <a:rPr kumimoji="1" lang="en-US" altLang="ko-KR" sz="1100" dirty="0"/>
+              <a:t>/</a:t>
+            </a:r>
+            <a:r>
+              <a:rPr kumimoji="1" lang="en-US" altLang="ko-KR" sz="1100" dirty="0" err="1"/>
+              <a:t>mlxtend</a:t>
+            </a:r>
+            <a:r>
+              <a:rPr kumimoji="1" lang="en-US" altLang="ko-KR" sz="1100" dirty="0"/>
+              <a:t>/</a:t>
+            </a:r>
+            <a:r>
+              <a:rPr kumimoji="1" lang="en-US" altLang="ko-KR" sz="1100" dirty="0" err="1"/>
+              <a:t>user_guide</a:t>
+            </a:r>
+            <a:r>
+              <a:rPr kumimoji="1" lang="en-US" altLang="ko-KR" sz="1100" dirty="0"/>
+              <a:t>/regressor/</a:t>
+            </a:r>
+            <a:r>
+              <a:rPr kumimoji="1" lang="en-US" altLang="ko-KR" sz="1100" dirty="0" err="1"/>
+              <a:t>StackingRegressor</a:t>
+            </a:r>
+            <a:r>
+              <a:rPr kumimoji="1" lang="en-US" altLang="ko-KR" sz="1100" dirty="0"/>
+              <a:t>/&gt;</a:t>
+            </a:r>
+            <a:endParaRPr kumimoji="1" lang="ko-KR" altLang="en-US" sz="1100" dirty="0"/>
+          </a:p>
+        </p:txBody>
+      </p:sp>
+      <p:pic>
+        <p:nvPicPr>
+          <p:cNvPr id="9" name="그림 8">
+            <a:extLst>
+              <a:ext uri="{FF2B5EF4-FFF2-40B4-BE49-F238E27FC236}">
+                <a16:creationId xmlns:a16="http://schemas.microsoft.com/office/drawing/2014/main" id="{0FA89EAF-C20B-5F44-980F-155F36E01DEA}"/>
+              </a:ext>
+            </a:extLst>
+          </p:cNvPr>
+          <p:cNvPicPr>
+            <a:picLocks noChangeAspect="1"/>
+          </p:cNvPicPr>
+          <p:nvPr/>
+        </p:nvPicPr>
+        <p:blipFill>
+          <a:blip r:embed="rId3"/>
+          <a:stretch>
+            <a:fillRect/>
+          </a:stretch>
+        </p:blipFill>
+        <p:spPr>
+          <a:xfrm>
+            <a:off x="6429825" y="4617691"/>
+            <a:ext cx="5566232" cy="1206166"/>
+          </a:xfrm>
+          <a:prstGeom prst="rect">
+            <a:avLst/>
+          </a:prstGeom>
+        </p:spPr>
+      </p:pic>
     </p:spTree>
     <p:extLst>
       <p:ext uri="{BB962C8B-B14F-4D97-AF65-F5344CB8AC3E}">
-        <p14:creationId xmlns:p14="http://schemas.microsoft.com/office/powerpoint/2010/main" val="2714429459"/>
+        <p14:creationId xmlns:p14="http://schemas.microsoft.com/office/powerpoint/2010/main" val="3527700324"/>
       </p:ext>
     </p:extLst>
   </p:cSld>
@@ -5370,7 +5645,7 @@
 </p:sld>
 </file>
 
-<file path=ppt/slides/slide7.xml><?xml version="1.0" encoding="utf-8"?>
+<file path=ppt/slides/slide5.xml><?xml version="1.0" encoding="utf-8"?>
 <p:sld xmlns:a="http://schemas.openxmlformats.org/drawingml/2006/main" xmlns:r="http://schemas.openxmlformats.org/officeDocument/2006/relationships" xmlns:p="http://schemas.openxmlformats.org/presentationml/2006/main">
   <p:cSld>
     <p:spTree>
@@ -5497,7 +5772,7 @@
           <a:p>
             <a:r>
               <a:rPr lang="en-US" sz="2500" dirty="0"/>
-              <a:t>2) Process</a:t>
+              <a:t>4) Averaged Model</a:t>
             </a:r>
           </a:p>
           <a:p>
@@ -5514,7 +5789,7 @@
           <p:cNvPr id="8" name="그림 7">
             <a:extLst>
               <a:ext uri="{FF2B5EF4-FFF2-40B4-BE49-F238E27FC236}">
-                <a16:creationId xmlns:a16="http://schemas.microsoft.com/office/drawing/2014/main" id="{F5E368C3-8CA8-0D43-961A-DAF7B0455206}"/>
+                <a16:creationId xmlns:a16="http://schemas.microsoft.com/office/drawing/2014/main" id="{56D9194C-80E0-264E-8BA5-B9BFD103D6C6}"/>
               </a:ext>
             </a:extLst>
           </p:cNvPr>
@@ -5531,102 +5806,18 @@
         </p:blipFill>
         <p:spPr>
           <a:xfrm>
-            <a:off x="341543" y="1619693"/>
-            <a:ext cx="11454466" cy="3091100"/>
+            <a:off x="944052" y="1674586"/>
+            <a:ext cx="9996091" cy="3964213"/>
           </a:xfrm>
           <a:prstGeom prst="rect">
             <a:avLst/>
           </a:prstGeom>
         </p:spPr>
       </p:pic>
-      <p:sp>
-        <p:nvSpPr>
-          <p:cNvPr id="9" name="TextBox 8">
-            <a:extLst>
-              <a:ext uri="{FF2B5EF4-FFF2-40B4-BE49-F238E27FC236}">
-                <a16:creationId xmlns:a16="http://schemas.microsoft.com/office/drawing/2014/main" id="{4DEE9636-219D-8344-8CCF-1FB9837E1B98}"/>
-              </a:ext>
-            </a:extLst>
-          </p:cNvPr>
-          <p:cNvSpPr txBox="1"/>
-          <p:nvPr/>
-        </p:nvSpPr>
-        <p:spPr>
-          <a:xfrm>
-            <a:off x="341543" y="4895495"/>
-            <a:ext cx="11454466" cy="2339102"/>
-          </a:xfrm>
-          <a:prstGeom prst="rect">
-            <a:avLst/>
-          </a:prstGeom>
-          <a:noFill/>
-        </p:spPr>
-        <p:txBody>
-          <a:bodyPr wrap="square" rtlCol="0">
-            <a:spAutoFit/>
-          </a:bodyPr>
-          <a:lstStyle/>
-          <a:p>
-            <a:pPr marL="285750" indent="-285750">
-              <a:buFont typeface="Arial" panose="020B0604020202020204" pitchFamily="34" charset="0"/>
-              <a:buChar char="•"/>
-            </a:pPr>
-            <a:r>
-              <a:rPr lang="en-US" sz="2400" dirty="0"/>
-              <a:t>Workflow for Model selection</a:t>
-            </a:r>
-          </a:p>
-          <a:p>
-            <a:pPr marL="742950" lvl="1" indent="-285750">
-              <a:buFont typeface="Arial" panose="020B0604020202020204" pitchFamily="34" charset="0"/>
-              <a:buChar char="•"/>
-            </a:pPr>
-            <a:r>
-              <a:rPr lang="en-US" sz="2400" dirty="0"/>
-              <a:t>Used Various Algorithm</a:t>
-            </a:r>
-          </a:p>
-          <a:p>
-            <a:pPr marL="742950" lvl="1" indent="-285750">
-              <a:buFont typeface="Arial" panose="020B0604020202020204" pitchFamily="34" charset="0"/>
-              <a:buChar char="•"/>
-            </a:pPr>
-            <a:r>
-              <a:rPr lang="en-US" sz="2400" dirty="0" err="1"/>
-              <a:t>GridSearch</a:t>
-            </a:r>
-            <a:r>
-              <a:rPr lang="en-US" sz="2400" dirty="0"/>
-              <a:t> for finding Hyperparameter </a:t>
-            </a:r>
-          </a:p>
-          <a:p>
-            <a:pPr marL="742950" lvl="1" indent="-285750">
-              <a:buFont typeface="Arial" panose="020B0604020202020204" pitchFamily="34" charset="0"/>
-              <a:buChar char="•"/>
-            </a:pPr>
-            <a:r>
-              <a:rPr lang="en-US" sz="2400" dirty="0"/>
-              <a:t>Made a Model ( Stacking / Averaged )  </a:t>
-            </a:r>
-            <a:endParaRPr lang="en-US" sz="2500" dirty="0"/>
-          </a:p>
-          <a:p>
-            <a:endParaRPr lang="en-US" sz="2500" dirty="0"/>
-          </a:p>
-          <a:p>
-            <a:pPr marL="285750" indent="-285750">
-              <a:buFont typeface="Arial" panose="020B0604020202020204" pitchFamily="34" charset="0"/>
-              <a:buChar char="•"/>
-            </a:pPr>
-            <a:endParaRPr lang="en-US" sz="2500" dirty="0"/>
-          </a:p>
-        </p:txBody>
-      </p:sp>
     </p:spTree>
     <p:extLst>
       <p:ext uri="{BB962C8B-B14F-4D97-AF65-F5344CB8AC3E}">
-        <p14:creationId xmlns:p14="http://schemas.microsoft.com/office/powerpoint/2010/main" val="1989933362"/>
+        <p14:creationId xmlns:p14="http://schemas.microsoft.com/office/powerpoint/2010/main" val="3462643882"/>
       </p:ext>
     </p:extLst>
   </p:cSld>
@@ -5636,7 +5827,7 @@
 </p:sld>
 </file>
 
-<file path=ppt/slides/slide8.xml><?xml version="1.0" encoding="utf-8"?>
+<file path=ppt/slides/slide6.xml><?xml version="1.0" encoding="utf-8"?>
 <p:sld xmlns:a="http://schemas.openxmlformats.org/drawingml/2006/main" xmlns:r="http://schemas.openxmlformats.org/officeDocument/2006/relationships" xmlns:p="http://schemas.openxmlformats.org/presentationml/2006/main">
   <p:cSld>
     <p:spTree>
@@ -5668,7 +5859,7 @@
         <p:spPr>
           <a:xfrm>
             <a:off x="341543" y="203431"/>
-            <a:ext cx="3361561" cy="630942"/>
+            <a:ext cx="5252848" cy="630942"/>
           </a:xfrm>
           <a:prstGeom prst="rect">
             <a:avLst/>
@@ -5683,7 +5874,7 @@
           <a:p>
             <a:r>
               <a:rPr lang="en-US" altLang="ko-KR" sz="3500" b="1" dirty="0"/>
-              <a:t>5. Predict Model </a:t>
+              <a:t>6. Tuning Hyper Parameter </a:t>
             </a:r>
             <a:endParaRPr lang="en-US" sz="3500" b="1" dirty="0"/>
           </a:p>
@@ -5748,7 +5939,7 @@
         <p:spPr>
           <a:xfrm>
             <a:off x="650272" y="942976"/>
-            <a:ext cx="10289871" cy="861774"/>
+            <a:ext cx="10289871" cy="907941"/>
           </a:xfrm>
           <a:prstGeom prst="rect">
             <a:avLst/>
@@ -5762,9 +5953,10 @@
           <a:lstStyle/>
           <a:p>
             <a:r>
-              <a:rPr lang="en-US" sz="2500" dirty="0"/>
-              <a:t>3) Stacking Regression</a:t>
-            </a:r>
+              <a:rPr lang="en-US" altLang="ko-KR" sz="2800" dirty="0"/>
+              <a:t>To make a better model is a very important process.</a:t>
+            </a:r>
+            <a:endParaRPr lang="en-US" sz="2500" dirty="0"/>
           </a:p>
           <a:p>
             <a:pPr marL="285750" indent="-285750">
@@ -5777,10 +5969,10 @@
       </p:sp>
       <p:pic>
         <p:nvPicPr>
-          <p:cNvPr id="5" name="그림 4">
-            <a:extLst>
-              <a:ext uri="{FF2B5EF4-FFF2-40B4-BE49-F238E27FC236}">
-                <a16:creationId xmlns:a16="http://schemas.microsoft.com/office/drawing/2014/main" id="{7D1BCD3E-C531-C44E-84C6-1C93EFAA6409}"/>
+          <p:cNvPr id="10" name="그림 9">
+            <a:extLst>
+              <a:ext uri="{FF2B5EF4-FFF2-40B4-BE49-F238E27FC236}">
+                <a16:creationId xmlns:a16="http://schemas.microsoft.com/office/drawing/2014/main" id="{42BA20B9-4878-2142-9DC6-C0B3E5F8CBB7}"/>
               </a:ext>
             </a:extLst>
           </p:cNvPr>
@@ -5797,25 +5989,20 @@
         </p:blipFill>
         <p:spPr>
           <a:xfrm>
-            <a:off x="711204" y="1804750"/>
-            <a:ext cx="5084003" cy="4204418"/>
+            <a:off x="565263" y="1850917"/>
+            <a:ext cx="6018554" cy="3953794"/>
           </a:xfrm>
           <a:prstGeom prst="rect">
             <a:avLst/>
           </a:prstGeom>
-          <a:ln>
-            <a:solidFill>
-              <a:schemeClr val="tx1"/>
-            </a:solidFill>
-          </a:ln>
         </p:spPr>
       </p:pic>
       <p:sp>
         <p:nvSpPr>
-          <p:cNvPr id="7" name="TextBox 6">
-            <a:extLst>
-              <a:ext uri="{FF2B5EF4-FFF2-40B4-BE49-F238E27FC236}">
-                <a16:creationId xmlns:a16="http://schemas.microsoft.com/office/drawing/2014/main" id="{A695EBE5-D2FE-8B45-9074-DD85E63A0FF9}"/>
+          <p:cNvPr id="6" name="TextBox 5">
+            <a:extLst>
+              <a:ext uri="{FF2B5EF4-FFF2-40B4-BE49-F238E27FC236}">
+                <a16:creationId xmlns:a16="http://schemas.microsoft.com/office/drawing/2014/main" id="{E3567FE8-4C28-6E4A-9358-C88BB4B1E4BF}"/>
               </a:ext>
             </a:extLst>
           </p:cNvPr>
@@ -5824,8 +6011,8 @@
         </p:nvSpPr>
         <p:spPr>
           <a:xfrm>
-            <a:off x="6174157" y="1804750"/>
-            <a:ext cx="5821900" cy="3770263"/>
+            <a:off x="6583817" y="1948980"/>
+            <a:ext cx="5608183" cy="3924151"/>
           </a:xfrm>
           <a:prstGeom prst="rect">
             <a:avLst/>
@@ -5838,187 +6025,120 @@
           </a:bodyPr>
           <a:lstStyle/>
           <a:p>
-            <a:pPr marL="285750" indent="-285750">
-              <a:buFont typeface="Arial" panose="020B0604020202020204" pitchFamily="34" charset="0"/>
-              <a:buChar char="•"/>
-            </a:pPr>
-            <a:r>
-              <a:rPr lang="en-US" sz="2400" dirty="0"/>
-              <a:t>Stacking is a method that combines </a:t>
-            </a:r>
-          </a:p>
-          <a:p>
-            <a:r>
-              <a:rPr lang="ko-KR" altLang="en-US" sz="2400" dirty="0"/>
-              <a:t> </a:t>
-            </a:r>
-            <a:r>
-              <a:rPr lang="en-US" sz="2400" dirty="0"/>
-              <a:t>predictions of several different models</a:t>
-            </a:r>
-          </a:p>
-          <a:p>
-            <a:endParaRPr lang="en-US" sz="2400" dirty="0"/>
-          </a:p>
-          <a:p>
             <a:pPr marL="342900" indent="-342900">
               <a:buFont typeface="Arial" panose="020B0604020202020204" pitchFamily="34" charset="0"/>
               <a:buChar char="•"/>
             </a:pPr>
             <a:r>
               <a:rPr lang="en-US" altLang="ko-KR" sz="2400" dirty="0"/>
-              <a:t>Various ML Algorithms can be mixed</a:t>
-            </a:r>
+              <a:t>Basically</a:t>
+            </a:r>
+            <a:r>
+              <a:rPr lang="ko-KR" altLang="en-US" sz="2400" dirty="0"/>
+              <a:t> </a:t>
+            </a:r>
+            <a:r>
+              <a:rPr lang="en-US" altLang="ko-KR" sz="2400" dirty="0"/>
+              <a:t>we can 3-way</a:t>
+            </a:r>
+          </a:p>
+          <a:p>
+            <a:pPr marL="800100" lvl="1" indent="-342900">
+              <a:buFont typeface="Arial" panose="020B0604020202020204" pitchFamily="34" charset="0"/>
+              <a:buChar char="•"/>
+            </a:pPr>
+            <a:r>
+              <a:rPr lang="en-US" altLang="ko-KR" sz="2400" dirty="0" err="1"/>
+              <a:t>GridSearch</a:t>
+            </a:r>
+            <a:r>
+              <a:rPr lang="en-US" altLang="ko-KR" sz="2400" dirty="0"/>
+              <a:t> </a:t>
+            </a:r>
+          </a:p>
+          <a:p>
+            <a:pPr marL="800100" lvl="1" indent="-342900">
+              <a:buFont typeface="Arial" panose="020B0604020202020204" pitchFamily="34" charset="0"/>
+              <a:buChar char="•"/>
+            </a:pPr>
+            <a:r>
+              <a:rPr lang="en-US" altLang="ko-KR" sz="2400" dirty="0" err="1"/>
+              <a:t>RandomSearch</a:t>
+            </a:r>
+            <a:endParaRPr lang="en-US" altLang="ko-KR" sz="2400" dirty="0"/>
+          </a:p>
+          <a:p>
+            <a:pPr marL="800100" lvl="1" indent="-342900">
+              <a:buFont typeface="Arial" panose="020B0604020202020204" pitchFamily="34" charset="0"/>
+              <a:buChar char="•"/>
+            </a:pPr>
+            <a:r>
+              <a:rPr lang="en-US" altLang="ko-KR" sz="2400" dirty="0"/>
+              <a:t>Bayesian Optimization</a:t>
+            </a:r>
+            <a:endParaRPr lang="en-US" sz="2500" dirty="0"/>
+          </a:p>
+          <a:p>
+            <a:endParaRPr lang="en-US" sz="2500" dirty="0"/>
           </a:p>
           <a:p>
             <a:pPr marL="342900" indent="-342900">
               <a:buFont typeface="Arial" panose="020B0604020202020204" pitchFamily="34" charset="0"/>
               <a:buChar char="•"/>
             </a:pPr>
-            <a:endParaRPr lang="en-US" sz="2400" dirty="0"/>
-          </a:p>
-          <a:p>
-            <a:pPr marL="342900" indent="-342900">
-              <a:buFont typeface="Arial" panose="020B0604020202020204" pitchFamily="34" charset="0"/>
-              <a:buChar char="•"/>
+            <a:r>
+              <a:rPr lang="en-US" sz="2500" dirty="0"/>
+              <a:t>We use the </a:t>
+            </a:r>
+            <a:r>
+              <a:rPr lang="en-US" sz="2500" dirty="0" err="1"/>
+              <a:t>GridSearch</a:t>
+            </a:r>
+            <a:r>
+              <a:rPr lang="en-US" sz="2500" dirty="0"/>
+              <a:t>.. Why?</a:t>
+            </a:r>
+          </a:p>
+          <a:p>
+            <a:pPr marL="914400" lvl="1" indent="-457200">
+              <a:buFont typeface="+mj-lt"/>
+              <a:buAutoNum type="alphaLcPeriod"/>
             </a:pPr>
             <a:r>
-              <a:rPr lang="en-US" sz="2400" dirty="0"/>
-              <a:t>Meta Regressor </a:t>
-            </a:r>
-          </a:p>
-          <a:p>
-            <a:pPr marL="800100" lvl="1" indent="-342900">
-              <a:buFont typeface="Arial" panose="020B0604020202020204" pitchFamily="34" charset="0"/>
-              <a:buChar char="•"/>
+              <a:rPr lang="en-US" sz="2500" dirty="0"/>
+              <a:t>Many Reference </a:t>
+            </a:r>
+          </a:p>
+          <a:p>
+            <a:pPr marL="914400" lvl="1" indent="-457200">
+              <a:buFont typeface="+mj-lt"/>
+              <a:buAutoNum type="alphaLcPeriod"/>
             </a:pPr>
             <a:r>
-              <a:rPr lang="en-US" altLang="ko-KR" sz="2000" dirty="0"/>
-              <a:t>An algorithm that combines different models</a:t>
-            </a:r>
-            <a:endParaRPr lang="en-US" sz="2000" dirty="0"/>
-          </a:p>
-          <a:p>
-            <a:pPr marL="342900" indent="-342900">
-              <a:buFont typeface="Arial" panose="020B0604020202020204" pitchFamily="34" charset="0"/>
-              <a:buChar char="•"/>
+              <a:rPr lang="en-US" sz="2500" dirty="0"/>
+              <a:t>Small train data </a:t>
+            </a:r>
+          </a:p>
+          <a:p>
+            <a:pPr marL="914400" lvl="1" indent="-457200">
+              <a:buFont typeface="+mj-lt"/>
+              <a:buAutoNum type="alphaLcPeriod"/>
             </a:pPr>
+            <a:r>
+              <a:rPr lang="en-US" altLang="ko-KR" sz="2800" dirty="0"/>
+              <a:t>apply whole range </a:t>
+            </a:r>
             <a:endParaRPr lang="en-US" sz="2500" dirty="0"/>
           </a:p>
           <a:p>
             <a:endParaRPr lang="en-US" sz="2500" dirty="0"/>
           </a:p>
-          <a:p>
-            <a:pPr marL="285750" indent="-285750">
-              <a:buFont typeface="Arial" panose="020B0604020202020204" pitchFamily="34" charset="0"/>
-              <a:buChar char="•"/>
-            </a:pPr>
-            <a:endParaRPr lang="en-US" sz="2500" dirty="0"/>
-          </a:p>
-        </p:txBody>
-      </p:sp>
-      <p:sp>
-        <p:nvSpPr>
-          <p:cNvPr id="6" name="TextBox 5">
-            <a:extLst>
-              <a:ext uri="{FF2B5EF4-FFF2-40B4-BE49-F238E27FC236}">
-                <a16:creationId xmlns:a16="http://schemas.microsoft.com/office/drawing/2014/main" id="{C60B0A5F-3475-EF46-94A8-7507B0AB651B}"/>
-              </a:ext>
-            </a:extLst>
-          </p:cNvPr>
-          <p:cNvSpPr txBox="1"/>
-          <p:nvPr/>
-        </p:nvSpPr>
-        <p:spPr>
-          <a:xfrm>
-            <a:off x="865607" y="6020307"/>
-            <a:ext cx="4775196" cy="261610"/>
-          </a:xfrm>
-          <a:prstGeom prst="rect">
-            <a:avLst/>
-          </a:prstGeom>
-          <a:noFill/>
-        </p:spPr>
-        <p:txBody>
-          <a:bodyPr wrap="square" rtlCol="0">
-            <a:spAutoFit/>
-          </a:bodyPr>
-          <a:lstStyle/>
-          <a:p>
-            <a:r>
-              <a:rPr kumimoji="1" lang="en-US" altLang="ko-KR" sz="1100" dirty="0"/>
-              <a:t>&lt;http://</a:t>
-            </a:r>
-            <a:r>
-              <a:rPr kumimoji="1" lang="en-US" altLang="ko-KR" sz="1100" dirty="0" err="1"/>
-              <a:t>rasbt.github.io</a:t>
-            </a:r>
-            <a:r>
-              <a:rPr kumimoji="1" lang="en-US" altLang="ko-KR" sz="1100" dirty="0"/>
-              <a:t>/</a:t>
-            </a:r>
-            <a:r>
-              <a:rPr kumimoji="1" lang="en-US" altLang="ko-KR" sz="1100" dirty="0" err="1"/>
-              <a:t>mlxtend</a:t>
-            </a:r>
-            <a:r>
-              <a:rPr kumimoji="1" lang="en-US" altLang="ko-KR" sz="1100" dirty="0"/>
-              <a:t>/</a:t>
-            </a:r>
-            <a:r>
-              <a:rPr kumimoji="1" lang="en-US" altLang="ko-KR" sz="1100" dirty="0" err="1"/>
-              <a:t>user_guide</a:t>
-            </a:r>
-            <a:r>
-              <a:rPr kumimoji="1" lang="en-US" altLang="ko-KR" sz="1100" dirty="0"/>
-              <a:t>/regressor/</a:t>
-            </a:r>
-            <a:r>
-              <a:rPr kumimoji="1" lang="en-US" altLang="ko-KR" sz="1100" dirty="0" err="1"/>
-              <a:t>StackingRegressor</a:t>
-            </a:r>
-            <a:r>
-              <a:rPr kumimoji="1" lang="en-US" altLang="ko-KR" sz="1100" dirty="0"/>
-              <a:t>/&gt;</a:t>
-            </a:r>
-            <a:endParaRPr kumimoji="1" lang="ko-KR" altLang="en-US" sz="1100" dirty="0"/>
-          </a:p>
-        </p:txBody>
-      </p:sp>
-      <p:pic>
-        <p:nvPicPr>
-          <p:cNvPr id="9" name="그림 8">
-            <a:extLst>
-              <a:ext uri="{FF2B5EF4-FFF2-40B4-BE49-F238E27FC236}">
-                <a16:creationId xmlns:a16="http://schemas.microsoft.com/office/drawing/2014/main" id="{0FA89EAF-C20B-5F44-980F-155F36E01DEA}"/>
-              </a:ext>
-            </a:extLst>
-          </p:cNvPr>
-          <p:cNvPicPr>
-            <a:picLocks noChangeAspect="1"/>
-          </p:cNvPicPr>
-          <p:nvPr/>
-        </p:nvPicPr>
-        <p:blipFill>
-          <a:blip r:embed="rId3"/>
-          <a:stretch>
-            <a:fillRect/>
-          </a:stretch>
-        </p:blipFill>
-        <p:spPr>
-          <a:xfrm>
-            <a:off x="6429825" y="4617691"/>
-            <a:ext cx="5566232" cy="1206166"/>
-          </a:xfrm>
-          <a:prstGeom prst="rect">
-            <a:avLst/>
-          </a:prstGeom>
-        </p:spPr>
-      </p:pic>
+        </p:txBody>
+      </p:sp>
     </p:spTree>
     <p:extLst>
       <p:ext uri="{BB962C8B-B14F-4D97-AF65-F5344CB8AC3E}">
-        <p14:creationId xmlns:p14="http://schemas.microsoft.com/office/powerpoint/2010/main" val="3527700324"/>
+        <p14:creationId xmlns:p14="http://schemas.microsoft.com/office/powerpoint/2010/main" val="2479846826"/>
       </p:ext>
     </p:extLst>
   </p:cSld>
@@ -6028,7 +6148,7 @@
 </p:sld>
 </file>
 
-<file path=ppt/slides/slide9.xml><?xml version="1.0" encoding="utf-8"?>
+<file path=ppt/slides/slide7.xml><?xml version="1.0" encoding="utf-8"?>
 <p:sld xmlns:a="http://schemas.openxmlformats.org/drawingml/2006/main" xmlns:r="http://schemas.openxmlformats.org/officeDocument/2006/relationships" xmlns:p="http://schemas.openxmlformats.org/presentationml/2006/main">
   <p:cSld>
     <p:spTree>
@@ -6060,7 +6180,7 @@
         <p:spPr>
           <a:xfrm>
             <a:off x="341543" y="203431"/>
-            <a:ext cx="3361561" cy="630942"/>
+            <a:ext cx="5252848" cy="630942"/>
           </a:xfrm>
           <a:prstGeom prst="rect">
             <a:avLst/>
@@ -6075,7 +6195,7 @@
           <a:p>
             <a:r>
               <a:rPr lang="en-US" altLang="ko-KR" sz="3500" b="1" dirty="0"/>
-              <a:t>5. Predict Model </a:t>
+              <a:t>6. Tuning Hyper Parameter </a:t>
             </a:r>
             <a:endParaRPr lang="en-US" sz="3500" b="1" dirty="0"/>
           </a:p>
@@ -6140,7 +6260,7 @@
         <p:spPr>
           <a:xfrm>
             <a:off x="650272" y="942976"/>
-            <a:ext cx="10289871" cy="861774"/>
+            <a:ext cx="10289871" cy="1338828"/>
           </a:xfrm>
           <a:prstGeom prst="rect">
             <a:avLst/>
@@ -6153,10 +6273,20 @@
           </a:bodyPr>
           <a:lstStyle/>
           <a:p>
-            <a:r>
-              <a:rPr lang="en-US" sz="2500" dirty="0"/>
-              <a:t>4) Averaged Model</a:t>
-            </a:r>
+            <a:pPr marL="514350" indent="-514350">
+              <a:buAutoNum type="arabicParenR"/>
+            </a:pPr>
+            <a:r>
+              <a:rPr lang="en-US" altLang="ko-KR" sz="2800" dirty="0"/>
+              <a:t>Make a Module </a:t>
+            </a:r>
+          </a:p>
+          <a:p>
+            <a:r>
+              <a:rPr lang="en-US" altLang="ko-KR" sz="2800" dirty="0"/>
+              <a:t>        : Use K-fold Cross validation = 5 </a:t>
+            </a:r>
+            <a:endParaRPr lang="en-US" sz="2500" dirty="0"/>
           </a:p>
           <a:p>
             <a:pPr marL="285750" indent="-285750">
@@ -6169,10 +6299,10 @@
       </p:sp>
       <p:pic>
         <p:nvPicPr>
-          <p:cNvPr id="8" name="그림 7">
-            <a:extLst>
-              <a:ext uri="{FF2B5EF4-FFF2-40B4-BE49-F238E27FC236}">
-                <a16:creationId xmlns:a16="http://schemas.microsoft.com/office/drawing/2014/main" id="{56D9194C-80E0-264E-8BA5-B9BFD103D6C6}"/>
+          <p:cNvPr id="5" name="그림 4">
+            <a:extLst>
+              <a:ext uri="{FF2B5EF4-FFF2-40B4-BE49-F238E27FC236}">
+                <a16:creationId xmlns:a16="http://schemas.microsoft.com/office/drawing/2014/main" id="{CE0423FE-B1E0-6D4B-9031-39CE1D8B8041}"/>
               </a:ext>
             </a:extLst>
           </p:cNvPr>
@@ -6189,8 +6319,38 @@
         </p:blipFill>
         <p:spPr>
           <a:xfrm>
-            <a:off x="944052" y="1674586"/>
-            <a:ext cx="9996091" cy="3964213"/>
+            <a:off x="650273" y="2100362"/>
+            <a:ext cx="5959939" cy="3712609"/>
+          </a:xfrm>
+          <a:prstGeom prst="rect">
+            <a:avLst/>
+          </a:prstGeom>
+        </p:spPr>
+      </p:pic>
+      <p:pic>
+        <p:nvPicPr>
+          <p:cNvPr id="7" name="그림 6">
+            <a:extLst>
+              <a:ext uri="{FF2B5EF4-FFF2-40B4-BE49-F238E27FC236}">
+                <a16:creationId xmlns:a16="http://schemas.microsoft.com/office/drawing/2014/main" id="{D99678B2-D422-434F-A556-C7BAC7894347}"/>
+              </a:ext>
+            </a:extLst>
+          </p:cNvPr>
+          <p:cNvPicPr>
+            <a:picLocks noChangeAspect="1"/>
+          </p:cNvPicPr>
+          <p:nvPr/>
+        </p:nvPicPr>
+        <p:blipFill>
+          <a:blip r:embed="rId3"/>
+          <a:stretch>
+            <a:fillRect/>
+          </a:stretch>
+        </p:blipFill>
+        <p:spPr>
+          <a:xfrm>
+            <a:off x="6713385" y="2100361"/>
+            <a:ext cx="5184701" cy="3712609"/>
           </a:xfrm>
           <a:prstGeom prst="rect">
             <a:avLst/>
@@ -6200,7 +6360,620 @@
     </p:spTree>
     <p:extLst>
       <p:ext uri="{BB962C8B-B14F-4D97-AF65-F5344CB8AC3E}">
-        <p14:creationId xmlns:p14="http://schemas.microsoft.com/office/powerpoint/2010/main" val="3462643882"/>
+        <p14:creationId xmlns:p14="http://schemas.microsoft.com/office/powerpoint/2010/main" val="1111786745"/>
+      </p:ext>
+    </p:extLst>
+  </p:cSld>
+  <p:clrMapOvr>
+    <a:masterClrMapping/>
+  </p:clrMapOvr>
+</p:sld>
+</file>
+
+<file path=ppt/slides/slide8.xml><?xml version="1.0" encoding="utf-8"?>
+<p:sld xmlns:a="http://schemas.openxmlformats.org/drawingml/2006/main" xmlns:r="http://schemas.openxmlformats.org/officeDocument/2006/relationships" xmlns:p="http://schemas.openxmlformats.org/presentationml/2006/main">
+  <p:cSld>
+    <p:spTree>
+      <p:nvGrpSpPr>
+        <p:cNvPr id="1" name=""/>
+        <p:cNvGrpSpPr/>
+        <p:nvPr/>
+      </p:nvGrpSpPr>
+      <p:grpSpPr>
+        <a:xfrm>
+          <a:off x="0" y="0"/>
+          <a:ext cx="0" cy="0"/>
+          <a:chOff x="0" y="0"/>
+          <a:chExt cx="0" cy="0"/>
+        </a:xfrm>
+      </p:grpSpPr>
+      <p:sp>
+        <p:nvSpPr>
+          <p:cNvPr id="2" name="TextBox 1">
+            <a:extLst>
+              <a:ext uri="{FF2B5EF4-FFF2-40B4-BE49-F238E27FC236}">
+                <a16:creationId xmlns:a16="http://schemas.microsoft.com/office/drawing/2014/main" id="{EDF47393-2711-364E-9815-E65EE9D0818E}"/>
+              </a:ext>
+            </a:extLst>
+          </p:cNvPr>
+          <p:cNvSpPr txBox="1"/>
+          <p:nvPr/>
+        </p:nvSpPr>
+        <p:spPr>
+          <a:xfrm>
+            <a:off x="341543" y="203431"/>
+            <a:ext cx="5252848" cy="630942"/>
+          </a:xfrm>
+          <a:prstGeom prst="rect">
+            <a:avLst/>
+          </a:prstGeom>
+          <a:noFill/>
+        </p:spPr>
+        <p:txBody>
+          <a:bodyPr wrap="none" rtlCol="0">
+            <a:spAutoFit/>
+          </a:bodyPr>
+          <a:lstStyle/>
+          <a:p>
+            <a:r>
+              <a:rPr lang="en-US" altLang="ko-KR" sz="3500" b="1" dirty="0"/>
+              <a:t>6. Tuning Hyper Parameter </a:t>
+            </a:r>
+            <a:endParaRPr lang="en-US" sz="3500" b="1" dirty="0"/>
+          </a:p>
+        </p:txBody>
+      </p:sp>
+      <p:cxnSp>
+        <p:nvCxnSpPr>
+          <p:cNvPr id="3" name="직선 연결선 58">
+            <a:extLst>
+              <a:ext uri="{FF2B5EF4-FFF2-40B4-BE49-F238E27FC236}">
+                <a16:creationId xmlns:a16="http://schemas.microsoft.com/office/drawing/2014/main" id="{0D2B0E42-FD7E-2748-84EA-74543AC2D5D6}"/>
+              </a:ext>
+            </a:extLst>
+          </p:cNvPr>
+          <p:cNvCxnSpPr/>
+          <p:nvPr/>
+        </p:nvCxnSpPr>
+        <p:spPr>
+          <a:xfrm>
+            <a:off x="199290" y="276019"/>
+            <a:ext cx="2096" cy="468000"/>
+          </a:xfrm>
+          <a:prstGeom prst="line">
+            <a:avLst/>
+          </a:prstGeom>
+          <a:ln w="3175">
+            <a:solidFill>
+              <a:schemeClr val="tx1">
+                <a:lumMod val="65000"/>
+                <a:lumOff val="35000"/>
+              </a:schemeClr>
+            </a:solidFill>
+          </a:ln>
+        </p:spPr>
+        <p:style>
+          <a:lnRef idx="1">
+            <a:schemeClr val="accent1"/>
+          </a:lnRef>
+          <a:fillRef idx="0">
+            <a:schemeClr val="accent1"/>
+          </a:fillRef>
+          <a:effectRef idx="0">
+            <a:schemeClr val="accent1"/>
+          </a:effectRef>
+          <a:fontRef idx="minor">
+            <a:schemeClr val="tx1"/>
+          </a:fontRef>
+        </p:style>
+      </p:cxnSp>
+      <p:sp>
+        <p:nvSpPr>
+          <p:cNvPr id="4" name="TextBox 3">
+            <a:extLst>
+              <a:ext uri="{FF2B5EF4-FFF2-40B4-BE49-F238E27FC236}">
+                <a16:creationId xmlns:a16="http://schemas.microsoft.com/office/drawing/2014/main" id="{A09E1A62-AD0E-5648-9B05-9DCDE8ADB4C3}"/>
+              </a:ext>
+            </a:extLst>
+          </p:cNvPr>
+          <p:cNvSpPr txBox="1"/>
+          <p:nvPr/>
+        </p:nvSpPr>
+        <p:spPr>
+          <a:xfrm>
+            <a:off x="650272" y="942976"/>
+            <a:ext cx="10289871" cy="1338828"/>
+          </a:xfrm>
+          <a:prstGeom prst="rect">
+            <a:avLst/>
+          </a:prstGeom>
+          <a:noFill/>
+        </p:spPr>
+        <p:txBody>
+          <a:bodyPr wrap="square" rtlCol="0">
+            <a:spAutoFit/>
+          </a:bodyPr>
+          <a:lstStyle/>
+          <a:p>
+            <a:r>
+              <a:rPr lang="en-US" altLang="ko-KR" sz="2800" dirty="0"/>
+              <a:t>2)   Find best Parameter  </a:t>
+            </a:r>
+          </a:p>
+          <a:p>
+            <a:r>
+              <a:rPr lang="en-US" altLang="ko-KR" sz="2800" dirty="0"/>
+              <a:t>       </a:t>
+            </a:r>
+            <a:endParaRPr lang="en-US" sz="2500" dirty="0"/>
+          </a:p>
+          <a:p>
+            <a:pPr marL="285750" indent="-285750">
+              <a:buFont typeface="Arial" panose="020B0604020202020204" pitchFamily="34" charset="0"/>
+              <a:buChar char="•"/>
+            </a:pPr>
+            <a:endParaRPr lang="en-US" sz="2500" dirty="0"/>
+          </a:p>
+        </p:txBody>
+      </p:sp>
+      <p:grpSp>
+        <p:nvGrpSpPr>
+          <p:cNvPr id="11" name="그룹 10">
+            <a:extLst>
+              <a:ext uri="{FF2B5EF4-FFF2-40B4-BE49-F238E27FC236}">
+                <a16:creationId xmlns:a16="http://schemas.microsoft.com/office/drawing/2014/main" id="{3A4E5AC8-E9FF-064A-873E-A170483627D4}"/>
+              </a:ext>
+            </a:extLst>
+          </p:cNvPr>
+          <p:cNvGrpSpPr/>
+          <p:nvPr/>
+        </p:nvGrpSpPr>
+        <p:grpSpPr>
+          <a:xfrm>
+            <a:off x="762001" y="1933461"/>
+            <a:ext cx="10964089" cy="3303979"/>
+            <a:chOff x="772886" y="2281804"/>
+            <a:chExt cx="10964089" cy="3303979"/>
+          </a:xfrm>
+        </p:grpSpPr>
+        <p:pic>
+          <p:nvPicPr>
+            <p:cNvPr id="8" name="그림 7">
+              <a:extLst>
+                <a:ext uri="{FF2B5EF4-FFF2-40B4-BE49-F238E27FC236}">
+                  <a16:creationId xmlns:a16="http://schemas.microsoft.com/office/drawing/2014/main" id="{9DC99011-F038-7D46-AF0C-82228436D9D8}"/>
+                </a:ext>
+              </a:extLst>
+            </p:cNvPr>
+            <p:cNvPicPr>
+              <a:picLocks noChangeAspect="1"/>
+            </p:cNvPicPr>
+            <p:nvPr/>
+          </p:nvPicPr>
+          <p:blipFill>
+            <a:blip r:embed="rId2"/>
+            <a:stretch>
+              <a:fillRect/>
+            </a:stretch>
+          </p:blipFill>
+          <p:spPr>
+            <a:xfrm>
+              <a:off x="772886" y="2423065"/>
+              <a:ext cx="10964089" cy="3162718"/>
+            </a:xfrm>
+            <a:prstGeom prst="rect">
+              <a:avLst/>
+            </a:prstGeom>
+          </p:spPr>
+        </p:pic>
+        <p:sp>
+          <p:nvSpPr>
+            <p:cNvPr id="6" name="직사각형 5">
+              <a:extLst>
+                <a:ext uri="{FF2B5EF4-FFF2-40B4-BE49-F238E27FC236}">
+                  <a16:creationId xmlns:a16="http://schemas.microsoft.com/office/drawing/2014/main" id="{CA57514A-0149-0E43-B143-DEF07189A0C0}"/>
+                </a:ext>
+              </a:extLst>
+            </p:cNvPr>
+            <p:cNvSpPr/>
+            <p:nvPr/>
+          </p:nvSpPr>
+          <p:spPr>
+            <a:xfrm>
+              <a:off x="6052456" y="2281804"/>
+              <a:ext cx="4757057" cy="689996"/>
+            </a:xfrm>
+            <a:prstGeom prst="rect">
+              <a:avLst/>
+            </a:prstGeom>
+            <a:noFill/>
+            <a:ln w="38100">
+              <a:solidFill>
+                <a:srgbClr val="FF0000"/>
+              </a:solidFill>
+            </a:ln>
+          </p:spPr>
+          <p:style>
+            <a:lnRef idx="2">
+              <a:schemeClr val="accent1">
+                <a:shade val="50000"/>
+              </a:schemeClr>
+            </a:lnRef>
+            <a:fillRef idx="1">
+              <a:schemeClr val="accent1"/>
+            </a:fillRef>
+            <a:effectRef idx="0">
+              <a:schemeClr val="accent1"/>
+            </a:effectRef>
+            <a:fontRef idx="minor">
+              <a:schemeClr val="lt1"/>
+            </a:fontRef>
+          </p:style>
+          <p:txBody>
+            <a:bodyPr rtlCol="0" anchor="ctr"/>
+            <a:lstStyle/>
+            <a:p>
+              <a:pPr algn="ctr"/>
+              <a:endParaRPr kumimoji="1" lang="ko-KR" altLang="en-US" dirty="0"/>
+            </a:p>
+          </p:txBody>
+        </p:sp>
+        <p:sp>
+          <p:nvSpPr>
+            <p:cNvPr id="10" name="직사각형 9">
+              <a:extLst>
+                <a:ext uri="{FF2B5EF4-FFF2-40B4-BE49-F238E27FC236}">
+                  <a16:creationId xmlns:a16="http://schemas.microsoft.com/office/drawing/2014/main" id="{16361EE6-D0C4-FD4D-BD17-24F70541404D}"/>
+                </a:ext>
+              </a:extLst>
+            </p:cNvPr>
+            <p:cNvSpPr/>
+            <p:nvPr/>
+          </p:nvSpPr>
+          <p:spPr>
+            <a:xfrm>
+              <a:off x="5594391" y="3902127"/>
+              <a:ext cx="6142584" cy="691643"/>
+            </a:xfrm>
+            <a:prstGeom prst="rect">
+              <a:avLst/>
+            </a:prstGeom>
+            <a:noFill/>
+            <a:ln w="38100">
+              <a:solidFill>
+                <a:srgbClr val="FF0000"/>
+              </a:solidFill>
+            </a:ln>
+          </p:spPr>
+          <p:style>
+            <a:lnRef idx="2">
+              <a:schemeClr val="accent1">
+                <a:shade val="50000"/>
+              </a:schemeClr>
+            </a:lnRef>
+            <a:fillRef idx="1">
+              <a:schemeClr val="accent1"/>
+            </a:fillRef>
+            <a:effectRef idx="0">
+              <a:schemeClr val="accent1"/>
+            </a:effectRef>
+            <a:fontRef idx="minor">
+              <a:schemeClr val="lt1"/>
+            </a:fontRef>
+          </p:style>
+          <p:txBody>
+            <a:bodyPr rtlCol="0" anchor="ctr"/>
+            <a:lstStyle/>
+            <a:p>
+              <a:pPr algn="ctr"/>
+              <a:endParaRPr kumimoji="1" lang="ko-KR" altLang="en-US" dirty="0"/>
+            </a:p>
+          </p:txBody>
+        </p:sp>
+      </p:grpSp>
+    </p:spTree>
+    <p:extLst>
+      <p:ext uri="{BB962C8B-B14F-4D97-AF65-F5344CB8AC3E}">
+        <p14:creationId xmlns:p14="http://schemas.microsoft.com/office/powerpoint/2010/main" val="3098982671"/>
+      </p:ext>
+    </p:extLst>
+  </p:cSld>
+  <p:clrMapOvr>
+    <a:masterClrMapping/>
+  </p:clrMapOvr>
+</p:sld>
+</file>
+
+<file path=ppt/slides/slide9.xml><?xml version="1.0" encoding="utf-8"?>
+<p:sld xmlns:a="http://schemas.openxmlformats.org/drawingml/2006/main" xmlns:r="http://schemas.openxmlformats.org/officeDocument/2006/relationships" xmlns:p="http://schemas.openxmlformats.org/presentationml/2006/main">
+  <p:cSld>
+    <p:spTree>
+      <p:nvGrpSpPr>
+        <p:cNvPr id="1" name=""/>
+        <p:cNvGrpSpPr/>
+        <p:nvPr/>
+      </p:nvGrpSpPr>
+      <p:grpSpPr>
+        <a:xfrm>
+          <a:off x="0" y="0"/>
+          <a:ext cx="0" cy="0"/>
+          <a:chOff x="0" y="0"/>
+          <a:chExt cx="0" cy="0"/>
+        </a:xfrm>
+      </p:grpSpPr>
+      <p:sp>
+        <p:nvSpPr>
+          <p:cNvPr id="2" name="TextBox 1">
+            <a:extLst>
+              <a:ext uri="{FF2B5EF4-FFF2-40B4-BE49-F238E27FC236}">
+                <a16:creationId xmlns:a16="http://schemas.microsoft.com/office/drawing/2014/main" id="{EDF47393-2711-364E-9815-E65EE9D0818E}"/>
+              </a:ext>
+            </a:extLst>
+          </p:cNvPr>
+          <p:cNvSpPr txBox="1"/>
+          <p:nvPr/>
+        </p:nvSpPr>
+        <p:spPr>
+          <a:xfrm>
+            <a:off x="341543" y="203431"/>
+            <a:ext cx="2664512" cy="630942"/>
+          </a:xfrm>
+          <a:prstGeom prst="rect">
+            <a:avLst/>
+          </a:prstGeom>
+          <a:noFill/>
+        </p:spPr>
+        <p:txBody>
+          <a:bodyPr wrap="none" rtlCol="0">
+            <a:spAutoFit/>
+          </a:bodyPr>
+          <a:lstStyle/>
+          <a:p>
+            <a:r>
+              <a:rPr lang="en-US" sz="3500" b="1" dirty="0"/>
+              <a:t>7. Conclusion</a:t>
+            </a:r>
+          </a:p>
+        </p:txBody>
+      </p:sp>
+      <p:cxnSp>
+        <p:nvCxnSpPr>
+          <p:cNvPr id="3" name="직선 연결선 58">
+            <a:extLst>
+              <a:ext uri="{FF2B5EF4-FFF2-40B4-BE49-F238E27FC236}">
+                <a16:creationId xmlns:a16="http://schemas.microsoft.com/office/drawing/2014/main" id="{0D2B0E42-FD7E-2748-84EA-74543AC2D5D6}"/>
+              </a:ext>
+            </a:extLst>
+          </p:cNvPr>
+          <p:cNvCxnSpPr/>
+          <p:nvPr/>
+        </p:nvCxnSpPr>
+        <p:spPr>
+          <a:xfrm>
+            <a:off x="199290" y="276019"/>
+            <a:ext cx="2096" cy="468000"/>
+          </a:xfrm>
+          <a:prstGeom prst="line">
+            <a:avLst/>
+          </a:prstGeom>
+          <a:ln w="3175">
+            <a:solidFill>
+              <a:schemeClr val="tx1">
+                <a:lumMod val="65000"/>
+                <a:lumOff val="35000"/>
+              </a:schemeClr>
+            </a:solidFill>
+          </a:ln>
+        </p:spPr>
+        <p:style>
+          <a:lnRef idx="1">
+            <a:schemeClr val="accent1"/>
+          </a:lnRef>
+          <a:fillRef idx="0">
+            <a:schemeClr val="accent1"/>
+          </a:fillRef>
+          <a:effectRef idx="0">
+            <a:schemeClr val="accent1"/>
+          </a:effectRef>
+          <a:fontRef idx="minor">
+            <a:schemeClr val="tx1"/>
+          </a:fontRef>
+        </p:style>
+      </p:cxnSp>
+      <p:sp>
+        <p:nvSpPr>
+          <p:cNvPr id="4" name="TextBox 3">
+            <a:extLst>
+              <a:ext uri="{FF2B5EF4-FFF2-40B4-BE49-F238E27FC236}">
+                <a16:creationId xmlns:a16="http://schemas.microsoft.com/office/drawing/2014/main" id="{A09E1A62-AD0E-5648-9B05-9DCDE8ADB4C3}"/>
+              </a:ext>
+            </a:extLst>
+          </p:cNvPr>
+          <p:cNvSpPr txBox="1"/>
+          <p:nvPr/>
+        </p:nvSpPr>
+        <p:spPr>
+          <a:xfrm>
+            <a:off x="650272" y="942976"/>
+            <a:ext cx="10289871" cy="861774"/>
+          </a:xfrm>
+          <a:prstGeom prst="rect">
+            <a:avLst/>
+          </a:prstGeom>
+          <a:noFill/>
+        </p:spPr>
+        <p:txBody>
+          <a:bodyPr wrap="square" rtlCol="0">
+            <a:spAutoFit/>
+          </a:bodyPr>
+          <a:lstStyle/>
+          <a:p>
+            <a:r>
+              <a:rPr lang="en-US" sz="2500" dirty="0"/>
+              <a:t>1) Final Score</a:t>
+            </a:r>
+          </a:p>
+          <a:p>
+            <a:pPr marL="285750" indent="-285750">
+              <a:buFont typeface="Arial" panose="020B0604020202020204" pitchFamily="34" charset="0"/>
+              <a:buChar char="•"/>
+            </a:pPr>
+            <a:endParaRPr lang="en-US" sz="2500" dirty="0"/>
+          </a:p>
+        </p:txBody>
+      </p:sp>
+      <p:sp>
+        <p:nvSpPr>
+          <p:cNvPr id="7" name="TextBox 6">
+            <a:extLst>
+              <a:ext uri="{FF2B5EF4-FFF2-40B4-BE49-F238E27FC236}">
+                <a16:creationId xmlns:a16="http://schemas.microsoft.com/office/drawing/2014/main" id="{BEE44A70-4F14-5B43-A934-581E324D7DD2}"/>
+              </a:ext>
+            </a:extLst>
+          </p:cNvPr>
+          <p:cNvSpPr txBox="1"/>
+          <p:nvPr/>
+        </p:nvSpPr>
+        <p:spPr>
+          <a:xfrm>
+            <a:off x="8327571" y="1804750"/>
+            <a:ext cx="3512000" cy="1708160"/>
+          </a:xfrm>
+          <a:prstGeom prst="rect">
+            <a:avLst/>
+          </a:prstGeom>
+          <a:noFill/>
+        </p:spPr>
+        <p:txBody>
+          <a:bodyPr wrap="square" rtlCol="0">
+            <a:spAutoFit/>
+          </a:bodyPr>
+          <a:lstStyle/>
+          <a:p>
+            <a:pPr marL="342900" indent="-342900" fontAlgn="base">
+              <a:buFont typeface="Arial" panose="020B0604020202020204" pitchFamily="34" charset="0"/>
+              <a:buChar char="•"/>
+            </a:pPr>
+            <a:r>
+              <a:rPr lang="en-US" sz="2000" dirty="0"/>
+              <a:t>Final Kaggle Score : </a:t>
+            </a:r>
+            <a:r>
+              <a:rPr lang="en-US" altLang="ko-KR" sz="2000" dirty="0"/>
+              <a:t>0.11554</a:t>
+            </a:r>
+          </a:p>
+          <a:p>
+            <a:pPr fontAlgn="base"/>
+            <a:endParaRPr lang="en-US" altLang="ko-KR" sz="2000" dirty="0"/>
+          </a:p>
+          <a:p>
+            <a:pPr marL="342900" indent="-342900" fontAlgn="base">
+              <a:buFont typeface="Arial" panose="020B0604020202020204" pitchFamily="34" charset="0"/>
+              <a:buChar char="•"/>
+            </a:pPr>
+            <a:r>
+              <a:rPr lang="en-US" altLang="ko-KR" sz="2000" b="1" u="sng" dirty="0"/>
+              <a:t>Top 8% </a:t>
+            </a:r>
+            <a:r>
+              <a:rPr lang="en-US" altLang="ko-KR" sz="2000" dirty="0"/>
+              <a:t>( 11/17, 2018 )</a:t>
+            </a:r>
+            <a:br>
+              <a:rPr lang="en-US" altLang="ko-KR" sz="2000" dirty="0"/>
+            </a:br>
+            <a:endParaRPr lang="en-US" sz="2000" dirty="0"/>
+          </a:p>
+          <a:p>
+            <a:pPr marL="285750" indent="-285750">
+              <a:buFont typeface="Arial" panose="020B0604020202020204" pitchFamily="34" charset="0"/>
+              <a:buChar char="•"/>
+            </a:pPr>
+            <a:endParaRPr lang="en-US" sz="2500" dirty="0"/>
+          </a:p>
+        </p:txBody>
+      </p:sp>
+      <p:pic>
+        <p:nvPicPr>
+          <p:cNvPr id="5" name="그림 4">
+            <a:extLst>
+              <a:ext uri="{FF2B5EF4-FFF2-40B4-BE49-F238E27FC236}">
+                <a16:creationId xmlns:a16="http://schemas.microsoft.com/office/drawing/2014/main" id="{2FA5A8A6-45F9-2840-B9E2-BFEAAF15FA68}"/>
+              </a:ext>
+            </a:extLst>
+          </p:cNvPr>
+          <p:cNvPicPr>
+            <a:picLocks noChangeAspect="1"/>
+          </p:cNvPicPr>
+          <p:nvPr/>
+        </p:nvPicPr>
+        <p:blipFill>
+          <a:blip r:embed="rId2"/>
+          <a:stretch>
+            <a:fillRect/>
+          </a:stretch>
+        </p:blipFill>
+        <p:spPr>
+          <a:xfrm>
+            <a:off x="650272" y="1578427"/>
+            <a:ext cx="7677299" cy="4050964"/>
+          </a:xfrm>
+          <a:prstGeom prst="rect">
+            <a:avLst/>
+          </a:prstGeom>
+        </p:spPr>
+      </p:pic>
+      <p:cxnSp>
+        <p:nvCxnSpPr>
+          <p:cNvPr id="8" name="직선 화살표 연결선 7">
+            <a:extLst>
+              <a:ext uri="{FF2B5EF4-FFF2-40B4-BE49-F238E27FC236}">
+                <a16:creationId xmlns:a16="http://schemas.microsoft.com/office/drawing/2014/main" id="{0B0640A1-8BD6-CC45-BA49-D726CC1CE55A}"/>
+              </a:ext>
+            </a:extLst>
+          </p:cNvPr>
+          <p:cNvCxnSpPr>
+            <a:cxnSpLocks/>
+          </p:cNvCxnSpPr>
+          <p:nvPr/>
+        </p:nvCxnSpPr>
+        <p:spPr>
+          <a:xfrm flipV="1">
+            <a:off x="7946571" y="2819401"/>
+            <a:ext cx="1088572" cy="2329542"/>
+          </a:xfrm>
+          <a:prstGeom prst="straightConnector1">
+            <a:avLst/>
+          </a:prstGeom>
+          <a:ln w="38100">
+            <a:solidFill>
+              <a:schemeClr val="accent2">
+                <a:lumMod val="75000"/>
+              </a:schemeClr>
+            </a:solidFill>
+            <a:tailEnd type="triangle"/>
+          </a:ln>
+        </p:spPr>
+        <p:style>
+          <a:lnRef idx="1">
+            <a:schemeClr val="accent1"/>
+          </a:lnRef>
+          <a:fillRef idx="0">
+            <a:schemeClr val="accent1"/>
+          </a:fillRef>
+          <a:effectRef idx="0">
+            <a:schemeClr val="accent1"/>
+          </a:effectRef>
+          <a:fontRef idx="minor">
+            <a:schemeClr val="tx1"/>
+          </a:fontRef>
+        </p:style>
+      </p:cxnSp>
+    </p:spTree>
+    <p:extLst>
+      <p:ext uri="{BB962C8B-B14F-4D97-AF65-F5344CB8AC3E}">
+        <p14:creationId xmlns:p14="http://schemas.microsoft.com/office/powerpoint/2010/main" val="1981028433"/>
       </p:ext>
     </p:extLst>
   </p:cSld>

</xml_diff>